<commit_message>
add some commets for Future and ConcurrentHashMap
</commit_message>
<xml_diff>
--- a/Document/Java Concurrency.pptx
+++ b/Document/Java Concurrency.pptx
@@ -8,6 +8,8 @@
     <p:sldId id="256" r:id="rId2"/>
     <p:sldId id="257" r:id="rId3"/>
     <p:sldId id="258" r:id="rId4"/>
+    <p:sldId id="259" r:id="rId5"/>
+    <p:sldId id="260" r:id="rId6"/>
   </p:sldIdLst>
   <p:sldSz cx="9144000" cy="6858000" type="screen4x3"/>
   <p:notesSz cx="6858000" cy="9144000"/>
@@ -291,7 +293,7 @@
             <a:fld id="{1D8BD707-D9CF-40AE-B4C6-C98DA3205C09}" type="datetimeFigureOut">
               <a:rPr lang="en-US" smtClean="0"/>
               <a:pPr/>
-              <a:t>9/16/2014</a:t>
+              <a:t>10/27/2014</a:t>
             </a:fld>
             <a:endParaRPr lang="en-US"/>
           </a:p>
@@ -458,7 +460,7 @@
             <a:fld id="{1D8BD707-D9CF-40AE-B4C6-C98DA3205C09}" type="datetimeFigureOut">
               <a:rPr lang="en-US" smtClean="0"/>
               <a:pPr/>
-              <a:t>9/16/2014</a:t>
+              <a:t>10/27/2014</a:t>
             </a:fld>
             <a:endParaRPr lang="en-US"/>
           </a:p>
@@ -635,7 +637,7 @@
             <a:fld id="{1D8BD707-D9CF-40AE-B4C6-C98DA3205C09}" type="datetimeFigureOut">
               <a:rPr lang="en-US" smtClean="0"/>
               <a:pPr/>
-              <a:t>9/16/2014</a:t>
+              <a:t>10/27/2014</a:t>
             </a:fld>
             <a:endParaRPr lang="en-US"/>
           </a:p>
@@ -802,7 +804,7 @@
             <a:fld id="{1D8BD707-D9CF-40AE-B4C6-C98DA3205C09}" type="datetimeFigureOut">
               <a:rPr lang="en-US" smtClean="0"/>
               <a:pPr/>
-              <a:t>9/16/2014</a:t>
+              <a:t>10/27/2014</a:t>
             </a:fld>
             <a:endParaRPr lang="en-US"/>
           </a:p>
@@ -1045,7 +1047,7 @@
             <a:fld id="{1D8BD707-D9CF-40AE-B4C6-C98DA3205C09}" type="datetimeFigureOut">
               <a:rPr lang="en-US" smtClean="0"/>
               <a:pPr/>
-              <a:t>9/16/2014</a:t>
+              <a:t>10/27/2014</a:t>
             </a:fld>
             <a:endParaRPr lang="en-US"/>
           </a:p>
@@ -1330,7 +1332,7 @@
             <a:fld id="{1D8BD707-D9CF-40AE-B4C6-C98DA3205C09}" type="datetimeFigureOut">
               <a:rPr lang="en-US" smtClean="0"/>
               <a:pPr/>
-              <a:t>9/16/2014</a:t>
+              <a:t>10/27/2014</a:t>
             </a:fld>
             <a:endParaRPr lang="en-US"/>
           </a:p>
@@ -1749,7 +1751,7 @@
             <a:fld id="{1D8BD707-D9CF-40AE-B4C6-C98DA3205C09}" type="datetimeFigureOut">
               <a:rPr lang="en-US" smtClean="0"/>
               <a:pPr/>
-              <a:t>9/16/2014</a:t>
+              <a:t>10/27/2014</a:t>
             </a:fld>
             <a:endParaRPr lang="en-US"/>
           </a:p>
@@ -1864,7 +1866,7 @@
             <a:fld id="{1D8BD707-D9CF-40AE-B4C6-C98DA3205C09}" type="datetimeFigureOut">
               <a:rPr lang="en-US" smtClean="0"/>
               <a:pPr/>
-              <a:t>9/16/2014</a:t>
+              <a:t>10/27/2014</a:t>
             </a:fld>
             <a:endParaRPr lang="en-US"/>
           </a:p>
@@ -1956,7 +1958,7 @@
             <a:fld id="{1D8BD707-D9CF-40AE-B4C6-C98DA3205C09}" type="datetimeFigureOut">
               <a:rPr lang="en-US" smtClean="0"/>
               <a:pPr/>
-              <a:t>9/16/2014</a:t>
+              <a:t>10/27/2014</a:t>
             </a:fld>
             <a:endParaRPr lang="en-US"/>
           </a:p>
@@ -2230,7 +2232,7 @@
             <a:fld id="{1D8BD707-D9CF-40AE-B4C6-C98DA3205C09}" type="datetimeFigureOut">
               <a:rPr lang="en-US" smtClean="0"/>
               <a:pPr/>
-              <a:t>9/16/2014</a:t>
+              <a:t>10/27/2014</a:t>
             </a:fld>
             <a:endParaRPr lang="en-US"/>
           </a:p>
@@ -2480,7 +2482,7 @@
             <a:fld id="{1D8BD707-D9CF-40AE-B4C6-C98DA3205C09}" type="datetimeFigureOut">
               <a:rPr lang="en-US" smtClean="0"/>
               <a:pPr/>
-              <a:t>9/16/2014</a:t>
+              <a:t>10/27/2014</a:t>
             </a:fld>
             <a:endParaRPr lang="en-US"/>
           </a:p>
@@ -2690,7 +2692,7 @@
             <a:fld id="{1D8BD707-D9CF-40AE-B4C6-C98DA3205C09}" type="datetimeFigureOut">
               <a:rPr lang="en-US" smtClean="0"/>
               <a:pPr/>
-              <a:t>9/16/2014</a:t>
+              <a:t>10/27/2014</a:t>
             </a:fld>
             <a:endParaRPr lang="en-US"/>
           </a:p>
@@ -3387,7 +3389,11 @@
           <a:bodyPr/>
           <a:lstStyle/>
           <a:p>
-            <a:endParaRPr lang="en-US"/>
+            <a:r>
+              <a:rPr lang="en-US" dirty="0" err="1" smtClean="0"/>
+              <a:t>ThreadPoolExecutor</a:t>
+            </a:r>
+            <a:endParaRPr lang="en-US" dirty="0"/>
           </a:p>
         </p:txBody>
       </p:sp>
@@ -3401,12 +3407,212 @@
             <p:ph idx="1"/>
           </p:nvPr>
         </p:nvSpPr>
-        <p:spPr/>
-        <p:txBody>
-          <a:bodyPr/>
-          <a:lstStyle/>
-          <a:p>
-            <a:endParaRPr lang="en-US"/>
+        <p:spPr>
+          <a:xfrm>
+            <a:off x="457200" y="1600201"/>
+            <a:ext cx="6324600" cy="2971800"/>
+          </a:xfrm>
+        </p:spPr>
+        <p:txBody>
+          <a:bodyPr>
+            <a:normAutofit fontScale="62500" lnSpcReduction="20000"/>
+          </a:bodyPr>
+          <a:lstStyle/>
+          <a:p>
+            <a:pPr marL="0" indent="0">
+              <a:buNone/>
+            </a:pPr>
+            <a:r>
+              <a:rPr lang="en-US" b="1" dirty="0"/>
+              <a:t>public </a:t>
+            </a:r>
+            <a:r>
+              <a:rPr lang="en-US" b="1" dirty="0" err="1"/>
+              <a:t>ThreadPoolExecutor</a:t>
+            </a:r>
+            <a:r>
+              <a:rPr lang="en-US" b="1" dirty="0"/>
+              <a:t>(</a:t>
+            </a:r>
+            <a:r>
+              <a:rPr lang="en-US" b="1" dirty="0" err="1"/>
+              <a:t>int</a:t>
+            </a:r>
+            <a:r>
+              <a:rPr lang="en-US" b="1" dirty="0"/>
+              <a:t> </a:t>
+            </a:r>
+            <a:r>
+              <a:rPr lang="en-US" b="1" dirty="0" err="1"/>
+              <a:t>corePoolSize</a:t>
+            </a:r>
+            <a:r>
+              <a:rPr lang="en-US" b="1" dirty="0"/>
+              <a:t>,</a:t>
+            </a:r>
+          </a:p>
+          <a:p>
+            <a:pPr marL="0" indent="0">
+              <a:buNone/>
+            </a:pPr>
+            <a:r>
+              <a:rPr lang="en-US" dirty="0"/>
+              <a:t>                              </a:t>
+            </a:r>
+            <a:r>
+              <a:rPr lang="en-US" b="1" dirty="0" err="1"/>
+              <a:t>int</a:t>
+            </a:r>
+            <a:r>
+              <a:rPr lang="en-US" b="1" dirty="0"/>
+              <a:t> </a:t>
+            </a:r>
+            <a:r>
+              <a:rPr lang="en-US" b="1" dirty="0" err="1"/>
+              <a:t>maximumPoolSize</a:t>
+            </a:r>
+            <a:r>
+              <a:rPr lang="en-US" b="1" dirty="0"/>
+              <a:t>,</a:t>
+            </a:r>
+          </a:p>
+          <a:p>
+            <a:pPr marL="0" indent="0">
+              <a:buNone/>
+            </a:pPr>
+            <a:r>
+              <a:rPr lang="en-US" dirty="0"/>
+              <a:t>                              </a:t>
+            </a:r>
+            <a:r>
+              <a:rPr lang="en-US" b="1" dirty="0"/>
+              <a:t>long </a:t>
+            </a:r>
+            <a:r>
+              <a:rPr lang="en-US" b="1" dirty="0" err="1"/>
+              <a:t>keepAliveTime</a:t>
+            </a:r>
+            <a:r>
+              <a:rPr lang="en-US" b="1" dirty="0"/>
+              <a:t>,</a:t>
+            </a:r>
+          </a:p>
+          <a:p>
+            <a:pPr marL="0" indent="0">
+              <a:buNone/>
+            </a:pPr>
+            <a:r>
+              <a:rPr lang="en-US" dirty="0"/>
+              <a:t>                              </a:t>
+            </a:r>
+            <a:r>
+              <a:rPr lang="en-US" dirty="0" err="1"/>
+              <a:t>TimeUnit</a:t>
+            </a:r>
+            <a:r>
+              <a:rPr lang="en-US" dirty="0"/>
+              <a:t> unit,</a:t>
+            </a:r>
+          </a:p>
+          <a:p>
+            <a:pPr marL="0" indent="0">
+              <a:buNone/>
+            </a:pPr>
+            <a:r>
+              <a:rPr lang="en-US" dirty="0"/>
+              <a:t>                              </a:t>
+            </a:r>
+            <a:r>
+              <a:rPr lang="en-US" dirty="0" err="1"/>
+              <a:t>BlockingQueue</a:t>
+            </a:r>
+            <a:r>
+              <a:rPr lang="en-US" dirty="0"/>
+              <a:t>&lt;Runnable&gt; </a:t>
+            </a:r>
+            <a:r>
+              <a:rPr lang="en-US" dirty="0" err="1"/>
+              <a:t>workQueue</a:t>
+            </a:r>
+            <a:r>
+              <a:rPr lang="en-US" dirty="0"/>
+              <a:t>) {</a:t>
+            </a:r>
+          </a:p>
+          <a:p>
+            <a:pPr marL="0" indent="0">
+              <a:buNone/>
+            </a:pPr>
+            <a:r>
+              <a:rPr lang="en-US" dirty="0"/>
+              <a:t>        </a:t>
+            </a:r>
+            <a:r>
+              <a:rPr lang="en-US" b="1" dirty="0"/>
+              <a:t>this(</a:t>
+            </a:r>
+            <a:r>
+              <a:rPr lang="en-US" b="1" dirty="0" err="1"/>
+              <a:t>corePoolSize</a:t>
+            </a:r>
+            <a:r>
+              <a:rPr lang="en-US" b="1" dirty="0"/>
+              <a:t>, </a:t>
+            </a:r>
+            <a:r>
+              <a:rPr lang="en-US" b="1" dirty="0" err="1"/>
+              <a:t>maximumPoolSize</a:t>
+            </a:r>
+            <a:r>
+              <a:rPr lang="en-US" b="1" dirty="0"/>
+              <a:t>, </a:t>
+            </a:r>
+            <a:r>
+              <a:rPr lang="en-US" b="1" dirty="0" err="1"/>
+              <a:t>keepAliveTime</a:t>
+            </a:r>
+            <a:r>
+              <a:rPr lang="en-US" b="1" dirty="0"/>
+              <a:t>, unit, </a:t>
+            </a:r>
+            <a:r>
+              <a:rPr lang="en-US" b="1" dirty="0" err="1"/>
+              <a:t>workQueue</a:t>
+            </a:r>
+            <a:r>
+              <a:rPr lang="en-US" b="1" dirty="0"/>
+              <a:t>,</a:t>
+            </a:r>
+          </a:p>
+          <a:p>
+            <a:pPr marL="0" indent="0">
+              <a:buNone/>
+            </a:pPr>
+            <a:r>
+              <a:rPr lang="en-US" dirty="0"/>
+              <a:t>             </a:t>
+            </a:r>
+            <a:r>
+              <a:rPr lang="en-US" dirty="0" err="1"/>
+              <a:t>Executors.</a:t>
+            </a:r>
+            <a:r>
+              <a:rPr lang="en-US" i="1" dirty="0" err="1"/>
+              <a:t>defaultThreadFactory</a:t>
+            </a:r>
+            <a:r>
+              <a:rPr lang="en-US" i="1" dirty="0"/>
+              <a:t>(), </a:t>
+            </a:r>
+            <a:r>
+              <a:rPr lang="en-US" b="1" i="1" dirty="0" err="1"/>
+              <a:t>defaultHandler</a:t>
+            </a:r>
+            <a:r>
+              <a:rPr lang="en-US" b="1" i="1" dirty="0"/>
+              <a:t>);</a:t>
+            </a:r>
+            <a:endParaRPr lang="en-US" dirty="0"/>
           </a:p>
         </p:txBody>
       </p:sp>
@@ -3414,6 +3620,240 @@
     <p:extLst>
       <p:ext uri="{BB962C8B-B14F-4D97-AF65-F5344CB8AC3E}">
         <p14:creationId xmlns:p14="http://schemas.microsoft.com/office/powerpoint/2010/main" val="284216610"/>
+      </p:ext>
+    </p:extLst>
+  </p:cSld>
+  <p:clrMapOvr>
+    <a:masterClrMapping/>
+  </p:clrMapOvr>
+</p:sld>
+</file>
+
+<file path=ppt/slides/slide4.xml><?xml version="1.0" encoding="utf-8"?>
+<p:sld xmlns:a="http://schemas.openxmlformats.org/drawingml/2006/main" xmlns:r="http://schemas.openxmlformats.org/officeDocument/2006/relationships" xmlns:p="http://schemas.openxmlformats.org/presentationml/2006/main">
+  <p:cSld>
+    <p:spTree>
+      <p:nvGrpSpPr>
+        <p:cNvPr id="1" name=""/>
+        <p:cNvGrpSpPr/>
+        <p:nvPr/>
+      </p:nvGrpSpPr>
+      <p:grpSpPr>
+        <a:xfrm>
+          <a:off x="0" y="0"/>
+          <a:ext cx="0" cy="0"/>
+          <a:chOff x="0" y="0"/>
+          <a:chExt cx="0" cy="0"/>
+        </a:xfrm>
+      </p:grpSpPr>
+      <p:sp>
+        <p:nvSpPr>
+          <p:cNvPr id="2" name="Title 1"/>
+          <p:cNvSpPr>
+            <a:spLocks noGrp="1"/>
+          </p:cNvSpPr>
+          <p:nvPr>
+            <p:ph type="title"/>
+          </p:nvPr>
+        </p:nvSpPr>
+        <p:spPr/>
+        <p:txBody>
+          <a:bodyPr/>
+          <a:lstStyle/>
+          <a:p>
+            <a:r>
+              <a:rPr lang="en-US" b="1" dirty="0" err="1"/>
+              <a:t>RejectedExecutionHandler</a:t>
+            </a:r>
+            <a:endParaRPr lang="en-US" dirty="0"/>
+          </a:p>
+        </p:txBody>
+      </p:sp>
+      <p:sp>
+        <p:nvSpPr>
+          <p:cNvPr id="3" name="Content Placeholder 2"/>
+          <p:cNvSpPr>
+            <a:spLocks noGrp="1"/>
+          </p:cNvSpPr>
+          <p:nvPr>
+            <p:ph idx="1"/>
+          </p:nvPr>
+        </p:nvSpPr>
+        <p:spPr/>
+        <p:txBody>
+          <a:bodyPr/>
+          <a:lstStyle/>
+          <a:p>
+            <a:r>
+              <a:rPr lang="en-US" b="1" dirty="0">
+                <a:hlinkClick r:id="rId2"/>
+              </a:rPr>
+              <a:t>http://</a:t>
+            </a:r>
+            <a:r>
+              <a:rPr lang="en-US" b="1" dirty="0" smtClean="0">
+                <a:hlinkClick r:id="rId2"/>
+              </a:rPr>
+              <a:t>dongxuan.iteye.com/blog/902571</a:t>
+            </a:r>
+            <a:endParaRPr lang="en-US" b="1" dirty="0" smtClean="0"/>
+          </a:p>
+          <a:p>
+            <a:r>
+              <a:rPr lang="en-US" b="1" dirty="0" err="1" smtClean="0"/>
+              <a:t>CallerRunsPolicy</a:t>
+            </a:r>
+            <a:endParaRPr lang="en-US" b="1" dirty="0" smtClean="0"/>
+          </a:p>
+          <a:p>
+            <a:r>
+              <a:rPr lang="en-US" b="1" dirty="0" err="1" smtClean="0"/>
+              <a:t>AbortPolicy</a:t>
+            </a:r>
+            <a:endParaRPr lang="en-US" b="1" dirty="0" smtClean="0"/>
+          </a:p>
+          <a:p>
+            <a:r>
+              <a:rPr lang="en-US" b="1" dirty="0" err="1" smtClean="0"/>
+              <a:t>DiscardPolicy</a:t>
+            </a:r>
+            <a:endParaRPr lang="en-US" b="1" dirty="0" smtClean="0"/>
+          </a:p>
+          <a:p>
+            <a:r>
+              <a:rPr lang="en-US" b="1" dirty="0" err="1"/>
+              <a:t>DiscardOldestPolicy</a:t>
+            </a:r>
+            <a:endParaRPr lang="en-US" dirty="0"/>
+          </a:p>
+        </p:txBody>
+      </p:sp>
+    </p:spTree>
+    <p:extLst>
+      <p:ext uri="{BB962C8B-B14F-4D97-AF65-F5344CB8AC3E}">
+        <p14:creationId xmlns:p14="http://schemas.microsoft.com/office/powerpoint/2010/main" val="731791040"/>
+      </p:ext>
+    </p:extLst>
+  </p:cSld>
+  <p:clrMapOvr>
+    <a:masterClrMapping/>
+  </p:clrMapOvr>
+</p:sld>
+</file>
+
+<file path=ppt/slides/slide5.xml><?xml version="1.0" encoding="utf-8"?>
+<p:sld xmlns:a="http://schemas.openxmlformats.org/drawingml/2006/main" xmlns:r="http://schemas.openxmlformats.org/officeDocument/2006/relationships" xmlns:p="http://schemas.openxmlformats.org/presentationml/2006/main">
+  <p:cSld>
+    <p:spTree>
+      <p:nvGrpSpPr>
+        <p:cNvPr id="1" name=""/>
+        <p:cNvGrpSpPr/>
+        <p:nvPr/>
+      </p:nvGrpSpPr>
+      <p:grpSpPr>
+        <a:xfrm>
+          <a:off x="0" y="0"/>
+          <a:ext cx="0" cy="0"/>
+          <a:chOff x="0" y="0"/>
+          <a:chExt cx="0" cy="0"/>
+        </a:xfrm>
+      </p:grpSpPr>
+      <p:sp>
+        <p:nvSpPr>
+          <p:cNvPr id="2" name="Title 1"/>
+          <p:cNvSpPr>
+            <a:spLocks noGrp="1"/>
+          </p:cNvSpPr>
+          <p:nvPr>
+            <p:ph type="title"/>
+          </p:nvPr>
+        </p:nvSpPr>
+        <p:spPr/>
+        <p:txBody>
+          <a:bodyPr/>
+          <a:lstStyle/>
+          <a:p>
+            <a:endParaRPr lang="en-US"/>
+          </a:p>
+        </p:txBody>
+      </p:sp>
+      <p:sp>
+        <p:nvSpPr>
+          <p:cNvPr id="3" name="Content Placeholder 2"/>
+          <p:cNvSpPr>
+            <a:spLocks noGrp="1"/>
+          </p:cNvSpPr>
+          <p:nvPr>
+            <p:ph idx="1"/>
+          </p:nvPr>
+        </p:nvSpPr>
+        <p:spPr/>
+        <p:txBody>
+          <a:bodyPr/>
+          <a:lstStyle/>
+          <a:p>
+            <a:endParaRPr lang="en-US" dirty="0"/>
+          </a:p>
+        </p:txBody>
+      </p:sp>
+      <p:pic>
+        <p:nvPicPr>
+          <p:cNvPr id="1026" name="Picture 2"/>
+          <p:cNvPicPr>
+            <a:picLocks noChangeAspect="1" noChangeArrowheads="1"/>
+          </p:cNvPicPr>
+          <p:nvPr/>
+        </p:nvPicPr>
+        <p:blipFill>
+          <a:blip r:embed="rId2">
+            <a:extLst>
+              <a:ext uri="{28A0092B-C50C-407E-A947-70E740481C1C}">
+                <a14:useLocalDpi xmlns:a14="http://schemas.microsoft.com/office/drawing/2010/main" val="0"/>
+              </a:ext>
+            </a:extLst>
+          </a:blip>
+          <a:srcRect/>
+          <a:stretch>
+            <a:fillRect/>
+          </a:stretch>
+        </p:blipFill>
+        <p:spPr bwMode="auto">
+          <a:xfrm>
+            <a:off x="2228850" y="2257425"/>
+            <a:ext cx="4686300" cy="2343150"/>
+          </a:xfrm>
+          <a:prstGeom prst="rect">
+            <a:avLst/>
+          </a:prstGeom>
+          <a:noFill/>
+          <a:ln>
+            <a:noFill/>
+          </a:ln>
+          <a:extLst>
+            <a:ext uri="{909E8E84-426E-40DD-AFC4-6F175D3DCCD1}">
+              <a14:hiddenFill xmlns:a14="http://schemas.microsoft.com/office/drawing/2010/main">
+                <a:solidFill>
+                  <a:schemeClr val="accent1"/>
+                </a:solidFill>
+              </a14:hiddenFill>
+            </a:ext>
+            <a:ext uri="{91240B29-F687-4F45-9708-019B960494DF}">
+              <a14:hiddenLine xmlns:a14="http://schemas.microsoft.com/office/drawing/2010/main" w="9525">
+                <a:solidFill>
+                  <a:schemeClr val="tx1"/>
+                </a:solidFill>
+                <a:miter lim="800000"/>
+                <a:headEnd/>
+                <a:tailEnd/>
+              </a14:hiddenLine>
+            </a:ext>
+          </a:extLst>
+        </p:spPr>
+      </p:pic>
+    </p:spTree>
+    <p:extLst>
+      <p:ext uri="{BB962C8B-B14F-4D97-AF65-F5344CB8AC3E}">
+        <p14:creationId xmlns:p14="http://schemas.microsoft.com/office/powerpoint/2010/main" val="614660712"/>
       </p:ext>
     </p:extLst>
   </p:cSld>

</xml_diff>

<commit_message>
add new slide in java concurrency session ppt
</commit_message>
<xml_diff>
--- a/Document/Java Concurrency.pptx
+++ b/Document/Java Concurrency.pptx
@@ -7,9 +7,13 @@
   <p:sldIdLst>
     <p:sldId id="256" r:id="rId2"/>
     <p:sldId id="257" r:id="rId3"/>
-    <p:sldId id="258" r:id="rId4"/>
-    <p:sldId id="259" r:id="rId5"/>
-    <p:sldId id="260" r:id="rId6"/>
+    <p:sldId id="261" r:id="rId4"/>
+    <p:sldId id="262" r:id="rId5"/>
+    <p:sldId id="263" r:id="rId6"/>
+    <p:sldId id="264" r:id="rId7"/>
+    <p:sldId id="258" r:id="rId8"/>
+    <p:sldId id="259" r:id="rId9"/>
+    <p:sldId id="260" r:id="rId10"/>
   </p:sldIdLst>
   <p:sldSz cx="9144000" cy="6858000" type="screen4x3"/>
   <p:notesSz cx="6858000" cy="9144000"/>
@@ -293,7 +297,7 @@
             <a:fld id="{1D8BD707-D9CF-40AE-B4C6-C98DA3205C09}" type="datetimeFigureOut">
               <a:rPr lang="en-US" smtClean="0"/>
               <a:pPr/>
-              <a:t>10/27/2014</a:t>
+              <a:t>11/3/2014</a:t>
             </a:fld>
             <a:endParaRPr lang="en-US"/>
           </a:p>
@@ -460,7 +464,7 @@
             <a:fld id="{1D8BD707-D9CF-40AE-B4C6-C98DA3205C09}" type="datetimeFigureOut">
               <a:rPr lang="en-US" smtClean="0"/>
               <a:pPr/>
-              <a:t>10/27/2014</a:t>
+              <a:t>11/3/2014</a:t>
             </a:fld>
             <a:endParaRPr lang="en-US"/>
           </a:p>
@@ -637,7 +641,7 @@
             <a:fld id="{1D8BD707-D9CF-40AE-B4C6-C98DA3205C09}" type="datetimeFigureOut">
               <a:rPr lang="en-US" smtClean="0"/>
               <a:pPr/>
-              <a:t>10/27/2014</a:t>
+              <a:t>11/3/2014</a:t>
             </a:fld>
             <a:endParaRPr lang="en-US"/>
           </a:p>
@@ -804,7 +808,7 @@
             <a:fld id="{1D8BD707-D9CF-40AE-B4C6-C98DA3205C09}" type="datetimeFigureOut">
               <a:rPr lang="en-US" smtClean="0"/>
               <a:pPr/>
-              <a:t>10/27/2014</a:t>
+              <a:t>11/3/2014</a:t>
             </a:fld>
             <a:endParaRPr lang="en-US"/>
           </a:p>
@@ -1047,7 +1051,7 @@
             <a:fld id="{1D8BD707-D9CF-40AE-B4C6-C98DA3205C09}" type="datetimeFigureOut">
               <a:rPr lang="en-US" smtClean="0"/>
               <a:pPr/>
-              <a:t>10/27/2014</a:t>
+              <a:t>11/3/2014</a:t>
             </a:fld>
             <a:endParaRPr lang="en-US"/>
           </a:p>
@@ -1332,7 +1336,7 @@
             <a:fld id="{1D8BD707-D9CF-40AE-B4C6-C98DA3205C09}" type="datetimeFigureOut">
               <a:rPr lang="en-US" smtClean="0"/>
               <a:pPr/>
-              <a:t>10/27/2014</a:t>
+              <a:t>11/3/2014</a:t>
             </a:fld>
             <a:endParaRPr lang="en-US"/>
           </a:p>
@@ -1751,7 +1755,7 @@
             <a:fld id="{1D8BD707-D9CF-40AE-B4C6-C98DA3205C09}" type="datetimeFigureOut">
               <a:rPr lang="en-US" smtClean="0"/>
               <a:pPr/>
-              <a:t>10/27/2014</a:t>
+              <a:t>11/3/2014</a:t>
             </a:fld>
             <a:endParaRPr lang="en-US"/>
           </a:p>
@@ -1866,7 +1870,7 @@
             <a:fld id="{1D8BD707-D9CF-40AE-B4C6-C98DA3205C09}" type="datetimeFigureOut">
               <a:rPr lang="en-US" smtClean="0"/>
               <a:pPr/>
-              <a:t>10/27/2014</a:t>
+              <a:t>11/3/2014</a:t>
             </a:fld>
             <a:endParaRPr lang="en-US"/>
           </a:p>
@@ -1958,7 +1962,7 @@
             <a:fld id="{1D8BD707-D9CF-40AE-B4C6-C98DA3205C09}" type="datetimeFigureOut">
               <a:rPr lang="en-US" smtClean="0"/>
               <a:pPr/>
-              <a:t>10/27/2014</a:t>
+              <a:t>11/3/2014</a:t>
             </a:fld>
             <a:endParaRPr lang="en-US"/>
           </a:p>
@@ -2232,7 +2236,7 @@
             <a:fld id="{1D8BD707-D9CF-40AE-B4C6-C98DA3205C09}" type="datetimeFigureOut">
               <a:rPr lang="en-US" smtClean="0"/>
               <a:pPr/>
-              <a:t>10/27/2014</a:t>
+              <a:t>11/3/2014</a:t>
             </a:fld>
             <a:endParaRPr lang="en-US"/>
           </a:p>
@@ -2482,7 +2486,7 @@
             <a:fld id="{1D8BD707-D9CF-40AE-B4C6-C98DA3205C09}" type="datetimeFigureOut">
               <a:rPr lang="en-US" smtClean="0"/>
               <a:pPr/>
-              <a:t>10/27/2014</a:t>
+              <a:t>11/3/2014</a:t>
             </a:fld>
             <a:endParaRPr lang="en-US"/>
           </a:p>
@@ -2692,7 +2696,7 @@
             <a:fld id="{1D8BD707-D9CF-40AE-B4C6-C98DA3205C09}" type="datetimeFigureOut">
               <a:rPr lang="en-US" smtClean="0"/>
               <a:pPr/>
-              <a:t>10/27/2014</a:t>
+              <a:t>11/3/2014</a:t>
             </a:fld>
             <a:endParaRPr lang="en-US"/>
           </a:p>
@@ -3246,6 +3250,44 @@
           </a:p>
           <a:p>
             <a:r>
+              <a:rPr lang="en-US" altLang="zh-CN" dirty="0" smtClean="0"/>
+              <a:t>Java memory</a:t>
+            </a:r>
+            <a:r>
+              <a:rPr lang="zh-CN" altLang="en-US" dirty="0" smtClean="0"/>
+              <a:t> </a:t>
+            </a:r>
+            <a:r>
+              <a:rPr lang="en-US" altLang="zh-CN" dirty="0" smtClean="0"/>
+              <a:t>model</a:t>
+            </a:r>
+            <a:r>
+              <a:rPr lang="zh-CN" altLang="en-US" dirty="0" smtClean="0"/>
+              <a:t> </a:t>
+            </a:r>
+            <a:endParaRPr lang="en-US" altLang="zh-CN" dirty="0" smtClean="0"/>
+          </a:p>
+          <a:p>
+            <a:pPr lvl="1"/>
+            <a:r>
+              <a:rPr lang="en-US" altLang="zh-CN" dirty="0" smtClean="0"/>
+              <a:t>Happens-before</a:t>
+            </a:r>
+          </a:p>
+          <a:p>
+            <a:pPr lvl="1"/>
+            <a:r>
+              <a:rPr lang="zh-CN" altLang="en-US" dirty="0" smtClean="0"/>
+              <a:t>重排序 </a:t>
+            </a:r>
+            <a:r>
+              <a:rPr lang="en-US" altLang="zh-CN" dirty="0" smtClean="0"/>
+              <a:t>reorder</a:t>
+            </a:r>
+            <a:endParaRPr lang="en-US" altLang="zh-CN" dirty="0" smtClean="0"/>
+          </a:p>
+          <a:p>
+            <a:r>
               <a:rPr lang="zh-CN" altLang="en-US" dirty="0" smtClean="0"/>
               <a:t>基</a:t>
             </a:r>
@@ -3390,8 +3432,8 @@
           <a:lstStyle/>
           <a:p>
             <a:r>
-              <a:rPr lang="en-US" dirty="0" err="1" smtClean="0"/>
-              <a:t>ThreadPoolExecutor</a:t>
+              <a:rPr lang="en-US" dirty="0" smtClean="0"/>
+              <a:t>Happens-Before</a:t>
             </a:r>
             <a:endParaRPr lang="en-US" dirty="0"/>
           </a:p>
@@ -3407,210 +3449,160 @@
             <p:ph idx="1"/>
           </p:nvPr>
         </p:nvSpPr>
-        <p:spPr>
-          <a:xfrm>
-            <a:off x="457200" y="1600201"/>
-            <a:ext cx="6324600" cy="2971800"/>
-          </a:xfrm>
-        </p:spPr>
+        <p:spPr/>
         <p:txBody>
           <a:bodyPr>
-            <a:normAutofit fontScale="62500" lnSpcReduction="20000"/>
+            <a:normAutofit fontScale="55000" lnSpcReduction="20000"/>
           </a:bodyPr>
           <a:lstStyle/>
           <a:p>
-            <a:pPr marL="0" indent="0">
-              <a:buNone/>
-            </a:pPr>
-            <a:r>
-              <a:rPr lang="en-US" b="1" dirty="0"/>
-              <a:t>public </a:t>
-            </a:r>
-            <a:r>
-              <a:rPr lang="en-US" b="1" dirty="0" err="1"/>
-              <a:t>ThreadPoolExecutor</a:t>
-            </a:r>
-            <a:r>
-              <a:rPr lang="en-US" b="1" dirty="0"/>
-              <a:t>(</a:t>
-            </a:r>
-            <a:r>
-              <a:rPr lang="en-US" b="1" dirty="0" err="1"/>
-              <a:t>int</a:t>
-            </a:r>
-            <a:r>
-              <a:rPr lang="en-US" b="1" dirty="0"/>
-              <a:t> </a:t>
-            </a:r>
-            <a:r>
-              <a:rPr lang="en-US" b="1" dirty="0" err="1"/>
-              <a:t>corePoolSize</a:t>
-            </a:r>
-            <a:r>
-              <a:rPr lang="en-US" b="1" dirty="0"/>
-              <a:t>,</a:t>
-            </a:r>
-          </a:p>
-          <a:p>
-            <a:pPr marL="0" indent="0">
-              <a:buNone/>
-            </a:pPr>
+            <a:r>
+              <a:rPr lang="zh-CN" altLang="en-US" dirty="0"/>
+              <a:t>为什么存在可见性问题？简单介绍下。相对于内存，</a:t>
+            </a:r>
             <a:r>
               <a:rPr lang="en-US" dirty="0"/>
-              <a:t>                              </a:t>
-            </a:r>
-            <a:r>
-              <a:rPr lang="en-US" b="1" dirty="0" err="1"/>
-              <a:t>int</a:t>
-            </a:r>
-            <a:r>
-              <a:rPr lang="en-US" b="1" dirty="0"/>
-              <a:t> </a:t>
-            </a:r>
-            <a:r>
-              <a:rPr lang="en-US" b="1" dirty="0" err="1"/>
-              <a:t>maximumPoolSize</a:t>
-            </a:r>
-            <a:r>
-              <a:rPr lang="en-US" b="1" dirty="0"/>
-              <a:t>,</a:t>
-            </a:r>
-          </a:p>
-          <a:p>
-            <a:pPr marL="0" indent="0">
-              <a:buNone/>
-            </a:pPr>
+              <a:t>CPU</a:t>
+            </a:r>
+            <a:r>
+              <a:rPr lang="zh-CN" altLang="en-US" dirty="0"/>
+              <a:t>的速度是极高的，如果</a:t>
+            </a:r>
             <a:r>
               <a:rPr lang="en-US" dirty="0"/>
-              <a:t>                              </a:t>
-            </a:r>
-            <a:r>
-              <a:rPr lang="en-US" b="1" dirty="0"/>
-              <a:t>long </a:t>
-            </a:r>
-            <a:r>
-              <a:rPr lang="en-US" b="1" dirty="0" err="1"/>
-              <a:t>keepAliveTime</a:t>
-            </a:r>
-            <a:r>
-              <a:rPr lang="en-US" b="1" dirty="0"/>
-              <a:t>,</a:t>
-            </a:r>
-          </a:p>
-          <a:p>
-            <a:pPr marL="0" indent="0">
-              <a:buNone/>
-            </a:pPr>
+              <a:t>CPU</a:t>
+            </a:r>
+            <a:r>
+              <a:rPr lang="zh-CN" altLang="en-US" dirty="0"/>
+              <a:t>需要存取数据时都直接与内存打交道，在存取过程中，</a:t>
+            </a:r>
             <a:r>
               <a:rPr lang="en-US" dirty="0"/>
-              <a:t>                              </a:t>
-            </a:r>
-            <a:r>
-              <a:rPr lang="en-US" dirty="0" err="1"/>
-              <a:t>TimeUnit</a:t>
+              <a:t>CPU</a:t>
+            </a:r>
+            <a:r>
+              <a:rPr lang="zh-CN" altLang="en-US" dirty="0"/>
+              <a:t>将一直空闲，这是一种极大的浪费，妈妈说，浪费是不好的，所以，现代的</a:t>
             </a:r>
             <a:r>
               <a:rPr lang="en-US" dirty="0"/>
-              <a:t> unit,</a:t>
-            </a:r>
-          </a:p>
-          <a:p>
-            <a:pPr marL="0" indent="0">
-              <a:buNone/>
-            </a:pPr>
+              <a:t>CPU</a:t>
+            </a:r>
+            <a:r>
+              <a:rPr lang="zh-CN" altLang="en-US" dirty="0"/>
+              <a:t>里都有很多寄存器，多级</a:t>
+            </a:r>
             <a:r>
               <a:rPr lang="en-US" dirty="0"/>
-              <a:t>                              </a:t>
-            </a:r>
-            <a:r>
-              <a:rPr lang="en-US" dirty="0" err="1"/>
-              <a:t>BlockingQueue</a:t>
+              <a:t>cache，</a:t>
+            </a:r>
+            <a:r>
+              <a:rPr lang="zh-CN" altLang="en-US" dirty="0"/>
+              <a:t>他们比内存的存取速度高多了。某个线程执行时，内存中的一份数据，会存在于该线程的工作存储中（</a:t>
+            </a:r>
+            <a:r>
+              <a:rPr lang="en-US" b="1" i="1" dirty="0"/>
+              <a:t>working memory，</a:t>
+            </a:r>
+            <a:r>
+              <a:rPr lang="zh-CN" altLang="en-US" b="1" i="1" dirty="0"/>
+              <a:t>是</a:t>
+            </a:r>
+            <a:r>
+              <a:rPr lang="en-US" b="1" i="1" dirty="0"/>
+              <a:t>cache</a:t>
+            </a:r>
+            <a:r>
+              <a:rPr lang="zh-CN" altLang="en-US" b="1" i="1" dirty="0"/>
+              <a:t>和寄存器的一个抽象，这个解释源于</a:t>
+            </a:r>
+            <a:r>
+              <a:rPr lang="en-US" altLang="zh-CN" b="1" i="1" dirty="0"/>
+              <a:t>《</a:t>
+            </a:r>
+            <a:r>
+              <a:rPr lang="en-US" b="1" i="1" dirty="0"/>
+              <a:t>Concurrent Programming in Java: Design Principles and Patterns, Second Edition》§2.2.7，</a:t>
+            </a:r>
+            <a:r>
+              <a:rPr lang="zh-CN" altLang="en-US" b="1" i="1" dirty="0"/>
+              <a:t>原文：</a:t>
+            </a:r>
+            <a:r>
+              <a:rPr lang="en-US" b="1" i="1" dirty="0"/>
+              <a:t>Every thread is defined to have a working memory (an abstraction of caches and registers) in which to store values. </a:t>
+            </a:r>
+            <a:r>
+              <a:rPr lang="zh-CN" altLang="en-US" b="1" i="1" dirty="0"/>
+              <a:t>有不少人觉得</a:t>
+            </a:r>
+            <a:r>
+              <a:rPr lang="en-US" b="1" i="1" dirty="0"/>
+              <a:t>working memory</a:t>
+            </a:r>
+            <a:r>
+              <a:rPr lang="zh-CN" altLang="en-US" b="1" i="1" dirty="0"/>
+              <a:t>是内存的某个部分，这可能是有些译作将</a:t>
+            </a:r>
+            <a:r>
+              <a:rPr lang="en-US" b="1" i="1" dirty="0"/>
+              <a:t>working memory</a:t>
+            </a:r>
+            <a:r>
+              <a:rPr lang="zh-CN" altLang="en-US" b="1" i="1" dirty="0"/>
+              <a:t>译为工作内存的缘故，为避免混淆，这里称其为工作存储，每个线程都有自己的工作存储</a:t>
+            </a:r>
+            <a:r>
+              <a:rPr lang="zh-CN" altLang="en-US" dirty="0"/>
+              <a:t>），并在某个特定时候回写到内存。单线程时，这没有问题，如果是多线程要同时访问同一个变量呢？内存中一个变量会存在于多个工作存储中，线程</a:t>
+            </a:r>
+            <a:r>
+              <a:rPr lang="en-US" altLang="zh-CN" dirty="0"/>
+              <a:t>1</a:t>
+            </a:r>
+            <a:r>
+              <a:rPr lang="zh-CN" altLang="en-US" dirty="0"/>
+              <a:t>修改了变量</a:t>
             </a:r>
             <a:r>
               <a:rPr lang="en-US" dirty="0"/>
-              <a:t>&lt;Runnable&gt; </a:t>
-            </a:r>
-            <a:r>
-              <a:rPr lang="en-US" dirty="0" err="1"/>
-              <a:t>workQueue</a:t>
-            </a:r>
-            <a:r>
-              <a:rPr lang="en-US" dirty="0"/>
-              <a:t>) {</a:t>
-            </a:r>
-          </a:p>
-          <a:p>
-            <a:pPr marL="0" indent="0">
-              <a:buNone/>
-            </a:pPr>
-            <a:r>
-              <a:rPr lang="en-US" dirty="0"/>
-              <a:t>        </a:t>
-            </a:r>
-            <a:r>
-              <a:rPr lang="en-US" b="1" dirty="0"/>
-              <a:t>this(</a:t>
-            </a:r>
-            <a:r>
-              <a:rPr lang="en-US" b="1" dirty="0" err="1"/>
-              <a:t>corePoolSize</a:t>
-            </a:r>
-            <a:r>
-              <a:rPr lang="en-US" b="1" dirty="0"/>
-              <a:t>, </a:t>
-            </a:r>
-            <a:r>
-              <a:rPr lang="en-US" b="1" dirty="0" err="1"/>
-              <a:t>maximumPoolSize</a:t>
-            </a:r>
-            <a:r>
-              <a:rPr lang="en-US" b="1" dirty="0"/>
-              <a:t>, </a:t>
-            </a:r>
-            <a:r>
-              <a:rPr lang="en-US" b="1" dirty="0" err="1"/>
-              <a:t>keepAliveTime</a:t>
-            </a:r>
-            <a:r>
-              <a:rPr lang="en-US" b="1" dirty="0"/>
-              <a:t>, unit, </a:t>
-            </a:r>
-            <a:r>
-              <a:rPr lang="en-US" b="1" dirty="0" err="1"/>
-              <a:t>workQueue</a:t>
-            </a:r>
-            <a:r>
-              <a:rPr lang="en-US" b="1" dirty="0"/>
-              <a:t>,</a:t>
-            </a:r>
-          </a:p>
-          <a:p>
-            <a:pPr marL="0" indent="0">
-              <a:buNone/>
-            </a:pPr>
-            <a:r>
-              <a:rPr lang="en-US" dirty="0"/>
-              <a:t>             </a:t>
-            </a:r>
-            <a:r>
-              <a:rPr lang="en-US" dirty="0" err="1"/>
-              <a:t>Executors.</a:t>
-            </a:r>
-            <a:r>
-              <a:rPr lang="en-US" i="1" dirty="0" err="1"/>
-              <a:t>defaultThreadFactory</a:t>
-            </a:r>
-            <a:r>
-              <a:rPr lang="en-US" i="1" dirty="0"/>
-              <a:t>(), </a:t>
-            </a:r>
-            <a:r>
-              <a:rPr lang="en-US" b="1" i="1" dirty="0" err="1"/>
-              <a:t>defaultHandler</a:t>
-            </a:r>
-            <a:r>
-              <a:rPr lang="en-US" b="1" i="1" dirty="0"/>
-              <a:t>);</a:t>
+              <a:t>a</a:t>
+            </a:r>
+            <a:r>
+              <a:rPr lang="zh-CN" altLang="en-US" dirty="0"/>
+              <a:t>的值什么时候对线程</a:t>
+            </a:r>
+            <a:r>
+              <a:rPr lang="en-US" altLang="zh-CN" dirty="0"/>
+              <a:t>2</a:t>
+            </a:r>
+            <a:r>
+              <a:rPr lang="zh-CN" altLang="en-US" dirty="0"/>
+              <a:t>可见？此外，编译器或运行时为了效率可以在允许的时候对指令进行</a:t>
+            </a:r>
+            <a:r>
+              <a:rPr lang="zh-CN" altLang="en-US" b="1" dirty="0"/>
+              <a:t>重排序</a:t>
+            </a:r>
+            <a:r>
+              <a:rPr lang="zh-CN" altLang="en-US" dirty="0"/>
+              <a:t>，重排序后的执行顺序就与代码不一致了，这样线程</a:t>
+            </a:r>
+            <a:r>
+              <a:rPr lang="en-US" altLang="zh-CN" dirty="0"/>
+              <a:t>2</a:t>
+            </a:r>
+            <a:r>
+              <a:rPr lang="zh-CN" altLang="en-US" dirty="0"/>
+              <a:t>读取某个变量的时候线程</a:t>
+            </a:r>
+            <a:r>
+              <a:rPr lang="en-US" altLang="zh-CN" dirty="0"/>
+              <a:t>1</a:t>
+            </a:r>
+            <a:r>
+              <a:rPr lang="zh-CN" altLang="en-US" dirty="0"/>
+              <a:t>可能还没有进行写入操作呢，虽然代码顺序上写操作是在前面的。这就是可见性问题的由来。</a:t>
             </a:r>
             <a:endParaRPr lang="en-US" dirty="0"/>
           </a:p>
@@ -3619,7 +3611,7 @@
     </p:spTree>
     <p:extLst>
       <p:ext uri="{BB962C8B-B14F-4D97-AF65-F5344CB8AC3E}">
-        <p14:creationId xmlns:p14="http://schemas.microsoft.com/office/powerpoint/2010/main" val="284216610"/>
+        <p14:creationId xmlns:p14="http://schemas.microsoft.com/office/powerpoint/2010/main" val="3342663980"/>
       </p:ext>
     </p:extLst>
   </p:cSld>
@@ -3661,6 +3653,824 @@
           <a:bodyPr/>
           <a:lstStyle/>
           <a:p>
+            <a:endParaRPr lang="en-US"/>
+          </a:p>
+        </p:txBody>
+      </p:sp>
+      <p:sp>
+        <p:nvSpPr>
+          <p:cNvPr id="3" name="Content Placeholder 2"/>
+          <p:cNvSpPr>
+            <a:spLocks noGrp="1"/>
+          </p:cNvSpPr>
+          <p:nvPr>
+            <p:ph idx="1"/>
+          </p:nvPr>
+        </p:nvSpPr>
+        <p:spPr/>
+        <p:txBody>
+          <a:bodyPr>
+            <a:normAutofit fontScale="85000" lnSpcReduction="20000"/>
+          </a:bodyPr>
+          <a:lstStyle/>
+          <a:p>
+            <a:pPr marL="0" indent="0">
+              <a:buNone/>
+            </a:pPr>
+            <a:r>
+              <a:rPr lang="zh-CN" altLang="en-US" dirty="0"/>
+              <a:t>是不是说解锁操作要先于锁定操作发生？这有违常规啊。确实不是这么理解的。</a:t>
+            </a:r>
+            <a:r>
+              <a:rPr lang="en-US" altLang="zh-CN" dirty="0"/>
+              <a:t>happens-before</a:t>
+            </a:r>
+            <a:r>
+              <a:rPr lang="zh-CN" altLang="en-US" dirty="0"/>
+              <a:t>规则不是描述实际操作的先后顺序，它是用来描述可见性的一种规则，下面我给上述两条规则换个说法：</a:t>
+            </a:r>
+          </a:p>
+          <a:p>
+            <a:r>
+              <a:rPr lang="zh-CN" altLang="en-US" dirty="0"/>
+              <a:t>如果线程</a:t>
+            </a:r>
+            <a:r>
+              <a:rPr lang="en-US" altLang="zh-CN" dirty="0"/>
+              <a:t>1</a:t>
+            </a:r>
+            <a:r>
+              <a:rPr lang="zh-CN" altLang="en-US" dirty="0"/>
+              <a:t>解锁了</a:t>
+            </a:r>
+            <a:r>
+              <a:rPr lang="en-US" altLang="zh-CN" dirty="0"/>
+              <a:t>monitor a</a:t>
+            </a:r>
+            <a:r>
+              <a:rPr lang="zh-CN" altLang="en-US" dirty="0"/>
+              <a:t>，接着线程</a:t>
+            </a:r>
+            <a:r>
+              <a:rPr lang="en-US" altLang="zh-CN" dirty="0"/>
+              <a:t>2</a:t>
+            </a:r>
+            <a:r>
+              <a:rPr lang="zh-CN" altLang="en-US" dirty="0"/>
+              <a:t>锁定了</a:t>
+            </a:r>
+            <a:r>
+              <a:rPr lang="en-US" altLang="zh-CN" dirty="0"/>
+              <a:t>a</a:t>
+            </a:r>
+            <a:r>
+              <a:rPr lang="zh-CN" altLang="en-US" dirty="0"/>
+              <a:t>，那么，线程</a:t>
+            </a:r>
+            <a:r>
+              <a:rPr lang="en-US" altLang="zh-CN" dirty="0"/>
+              <a:t>1</a:t>
+            </a:r>
+            <a:r>
+              <a:rPr lang="zh-CN" altLang="en-US" dirty="0"/>
+              <a:t>解锁</a:t>
+            </a:r>
+            <a:r>
+              <a:rPr lang="en-US" altLang="zh-CN" dirty="0"/>
+              <a:t>a</a:t>
+            </a:r>
+            <a:r>
+              <a:rPr lang="zh-CN" altLang="en-US" dirty="0"/>
+              <a:t>之前的写操作都对线程</a:t>
+            </a:r>
+            <a:r>
+              <a:rPr lang="en-US" altLang="zh-CN" dirty="0"/>
+              <a:t>2</a:t>
+            </a:r>
+            <a:r>
+              <a:rPr lang="zh-CN" altLang="en-US" dirty="0"/>
+              <a:t>可见（线程</a:t>
+            </a:r>
+            <a:r>
+              <a:rPr lang="en-US" altLang="zh-CN" dirty="0"/>
+              <a:t>1</a:t>
+            </a:r>
+            <a:r>
+              <a:rPr lang="zh-CN" altLang="en-US" dirty="0"/>
+              <a:t>和线程</a:t>
+            </a:r>
+            <a:r>
+              <a:rPr lang="en-US" altLang="zh-CN" dirty="0"/>
+              <a:t>2</a:t>
+            </a:r>
+            <a:r>
+              <a:rPr lang="zh-CN" altLang="en-US" dirty="0"/>
+              <a:t>可以是同一个线程）。</a:t>
+            </a:r>
+          </a:p>
+          <a:p>
+            <a:r>
+              <a:rPr lang="zh-CN" altLang="en-US" dirty="0"/>
+              <a:t>如果线程</a:t>
+            </a:r>
+            <a:r>
+              <a:rPr lang="en-US" altLang="zh-CN" dirty="0"/>
+              <a:t>1</a:t>
+            </a:r>
+            <a:r>
+              <a:rPr lang="zh-CN" altLang="en-US" dirty="0"/>
+              <a:t>写入了</a:t>
+            </a:r>
+            <a:r>
+              <a:rPr lang="en-US" altLang="zh-CN" dirty="0"/>
+              <a:t>volatile</a:t>
+            </a:r>
+            <a:r>
+              <a:rPr lang="zh-CN" altLang="en-US" dirty="0"/>
+              <a:t>变量</a:t>
+            </a:r>
+            <a:r>
+              <a:rPr lang="en-US" altLang="zh-CN" dirty="0"/>
+              <a:t>v</a:t>
+            </a:r>
+            <a:r>
+              <a:rPr lang="zh-CN" altLang="en-US" dirty="0"/>
+              <a:t>（这里和后续的“变量”都指的是对象的字段、类字段和数组元素），接着线程</a:t>
+            </a:r>
+            <a:r>
+              <a:rPr lang="en-US" altLang="zh-CN" dirty="0"/>
+              <a:t>2</a:t>
+            </a:r>
+            <a:r>
+              <a:rPr lang="zh-CN" altLang="en-US" dirty="0"/>
+              <a:t>读取了</a:t>
+            </a:r>
+            <a:r>
+              <a:rPr lang="en-US" altLang="zh-CN" dirty="0"/>
+              <a:t>v</a:t>
+            </a:r>
+            <a:r>
+              <a:rPr lang="zh-CN" altLang="en-US" dirty="0"/>
+              <a:t>，那么，线程</a:t>
+            </a:r>
+            <a:r>
+              <a:rPr lang="en-US" altLang="zh-CN" dirty="0"/>
+              <a:t>1</a:t>
+            </a:r>
+            <a:r>
+              <a:rPr lang="zh-CN" altLang="en-US" dirty="0"/>
+              <a:t>写入</a:t>
+            </a:r>
+            <a:r>
+              <a:rPr lang="en-US" altLang="zh-CN" dirty="0"/>
+              <a:t>v</a:t>
+            </a:r>
+            <a:r>
+              <a:rPr lang="zh-CN" altLang="en-US" dirty="0"/>
+              <a:t>及之前的写操作都对线程</a:t>
+            </a:r>
+            <a:r>
+              <a:rPr lang="en-US" altLang="zh-CN" dirty="0"/>
+              <a:t>2</a:t>
+            </a:r>
+            <a:r>
+              <a:rPr lang="zh-CN" altLang="en-US" dirty="0"/>
+              <a:t>可见（线程</a:t>
+            </a:r>
+            <a:r>
+              <a:rPr lang="en-US" altLang="zh-CN" dirty="0"/>
+              <a:t>1</a:t>
+            </a:r>
+            <a:r>
+              <a:rPr lang="zh-CN" altLang="en-US" dirty="0"/>
+              <a:t>和线程</a:t>
+            </a:r>
+            <a:r>
+              <a:rPr lang="en-US" altLang="zh-CN" dirty="0"/>
+              <a:t>2</a:t>
+            </a:r>
+            <a:r>
+              <a:rPr lang="zh-CN" altLang="en-US" dirty="0"/>
+              <a:t>可以是同一个线程）。</a:t>
+            </a:r>
+          </a:p>
+          <a:p>
+            <a:endParaRPr lang="en-US" dirty="0"/>
+          </a:p>
+        </p:txBody>
+      </p:sp>
+    </p:spTree>
+    <p:extLst>
+      <p:ext uri="{BB962C8B-B14F-4D97-AF65-F5344CB8AC3E}">
+        <p14:creationId xmlns:p14="http://schemas.microsoft.com/office/powerpoint/2010/main" val="757113379"/>
+      </p:ext>
+    </p:extLst>
+  </p:cSld>
+  <p:clrMapOvr>
+    <a:masterClrMapping/>
+  </p:clrMapOvr>
+</p:sld>
+</file>
+
+<file path=ppt/slides/slide5.xml><?xml version="1.0" encoding="utf-8"?>
+<p:sld xmlns:a="http://schemas.openxmlformats.org/drawingml/2006/main" xmlns:r="http://schemas.openxmlformats.org/officeDocument/2006/relationships" xmlns:p="http://schemas.openxmlformats.org/presentationml/2006/main">
+  <p:cSld>
+    <p:spTree>
+      <p:nvGrpSpPr>
+        <p:cNvPr id="1" name=""/>
+        <p:cNvGrpSpPr/>
+        <p:nvPr/>
+      </p:nvGrpSpPr>
+      <p:grpSpPr>
+        <a:xfrm>
+          <a:off x="0" y="0"/>
+          <a:ext cx="0" cy="0"/>
+          <a:chOff x="0" y="0"/>
+          <a:chExt cx="0" cy="0"/>
+        </a:xfrm>
+      </p:grpSpPr>
+      <p:sp>
+        <p:nvSpPr>
+          <p:cNvPr id="2" name="Title 1"/>
+          <p:cNvSpPr>
+            <a:spLocks noGrp="1"/>
+          </p:cNvSpPr>
+          <p:nvPr>
+            <p:ph type="title"/>
+          </p:nvPr>
+        </p:nvSpPr>
+        <p:spPr/>
+        <p:txBody>
+          <a:bodyPr/>
+          <a:lstStyle/>
+          <a:p>
+            <a:r>
+              <a:rPr lang="en-US" dirty="0" smtClean="0"/>
+              <a:t>reorder</a:t>
+            </a:r>
+            <a:endParaRPr lang="en-US" dirty="0"/>
+          </a:p>
+        </p:txBody>
+      </p:sp>
+      <p:sp>
+        <p:nvSpPr>
+          <p:cNvPr id="3" name="Content Placeholder 2"/>
+          <p:cNvSpPr>
+            <a:spLocks noGrp="1"/>
+          </p:cNvSpPr>
+          <p:nvPr>
+            <p:ph idx="1"/>
+          </p:nvPr>
+        </p:nvSpPr>
+        <p:spPr/>
+        <p:txBody>
+          <a:bodyPr/>
+          <a:lstStyle/>
+          <a:p>
+            <a:r>
+              <a:rPr lang="en-US" dirty="0"/>
+              <a:t>class </a:t>
+            </a:r>
+            <a:r>
+              <a:rPr lang="en-US" dirty="0" err="1"/>
+              <a:t>ReorderExample</a:t>
+            </a:r>
+            <a:r>
+              <a:rPr lang="en-US" dirty="0"/>
+              <a:t> { </a:t>
+            </a:r>
+            <a:r>
+              <a:rPr lang="en-US" dirty="0" err="1"/>
+              <a:t>int</a:t>
+            </a:r>
+            <a:r>
+              <a:rPr lang="en-US" dirty="0"/>
+              <a:t> a = 0; </a:t>
+            </a:r>
+            <a:r>
+              <a:rPr lang="en-US" dirty="0" err="1"/>
+              <a:t>boolean</a:t>
+            </a:r>
+            <a:r>
+              <a:rPr lang="en-US" dirty="0"/>
+              <a:t> flag = false; public void writer() { a = 1; //1 flag = true; //2 } Public void reader() { if (flag) { //3 </a:t>
+            </a:r>
+            <a:r>
+              <a:rPr lang="en-US" dirty="0" err="1"/>
+              <a:t>int</a:t>
+            </a:r>
+            <a:r>
+              <a:rPr lang="en-US" dirty="0"/>
+              <a:t> </a:t>
+            </a:r>
+            <a:r>
+              <a:rPr lang="en-US" dirty="0" err="1"/>
+              <a:t>i</a:t>
+            </a:r>
+            <a:r>
+              <a:rPr lang="en-US" dirty="0"/>
+              <a:t> = a * a; //4 …… } } }</a:t>
+            </a:r>
+          </a:p>
+        </p:txBody>
+      </p:sp>
+    </p:spTree>
+    <p:extLst>
+      <p:ext uri="{BB962C8B-B14F-4D97-AF65-F5344CB8AC3E}">
+        <p14:creationId xmlns:p14="http://schemas.microsoft.com/office/powerpoint/2010/main" val="1986579275"/>
+      </p:ext>
+    </p:extLst>
+  </p:cSld>
+  <p:clrMapOvr>
+    <a:masterClrMapping/>
+  </p:clrMapOvr>
+</p:sld>
+</file>
+
+<file path=ppt/slides/slide6.xml><?xml version="1.0" encoding="utf-8"?>
+<p:sld xmlns:a="http://schemas.openxmlformats.org/drawingml/2006/main" xmlns:r="http://schemas.openxmlformats.org/officeDocument/2006/relationships" xmlns:p="http://schemas.openxmlformats.org/presentationml/2006/main">
+  <p:cSld>
+    <p:spTree>
+      <p:nvGrpSpPr>
+        <p:cNvPr id="1" name=""/>
+        <p:cNvGrpSpPr/>
+        <p:nvPr/>
+      </p:nvGrpSpPr>
+      <p:grpSpPr>
+        <a:xfrm>
+          <a:off x="0" y="0"/>
+          <a:ext cx="0" cy="0"/>
+          <a:chOff x="0" y="0"/>
+          <a:chExt cx="0" cy="0"/>
+        </a:xfrm>
+      </p:grpSpPr>
+      <p:sp>
+        <p:nvSpPr>
+          <p:cNvPr id="2" name="Title 1"/>
+          <p:cNvSpPr>
+            <a:spLocks noGrp="1"/>
+          </p:cNvSpPr>
+          <p:nvPr>
+            <p:ph type="title"/>
+          </p:nvPr>
+        </p:nvSpPr>
+        <p:spPr/>
+        <p:txBody>
+          <a:bodyPr/>
+          <a:lstStyle/>
+          <a:p>
+            <a:endParaRPr lang="en-US"/>
+          </a:p>
+        </p:txBody>
+      </p:sp>
+      <p:sp>
+        <p:nvSpPr>
+          <p:cNvPr id="3" name="Content Placeholder 2"/>
+          <p:cNvSpPr>
+            <a:spLocks noGrp="1"/>
+          </p:cNvSpPr>
+          <p:nvPr>
+            <p:ph idx="1"/>
+          </p:nvPr>
+        </p:nvSpPr>
+        <p:spPr/>
+        <p:txBody>
+          <a:bodyPr/>
+          <a:lstStyle/>
+          <a:p>
+            <a:r>
+              <a:rPr lang="en-US" altLang="zh-CN" dirty="0"/>
+              <a:t>flag</a:t>
+            </a:r>
+            <a:r>
+              <a:rPr lang="zh-CN" altLang="en-US" dirty="0"/>
+              <a:t>变量是个标记，用来标识变量</a:t>
+            </a:r>
+            <a:r>
+              <a:rPr lang="en-US" altLang="zh-CN" dirty="0"/>
+              <a:t>a</a:t>
+            </a:r>
+            <a:r>
+              <a:rPr lang="zh-CN" altLang="en-US" dirty="0"/>
+              <a:t>是否已被写入。这里假设有两个线程</a:t>
+            </a:r>
+            <a:r>
+              <a:rPr lang="en-US" altLang="zh-CN" dirty="0"/>
+              <a:t>A</a:t>
+            </a:r>
+            <a:r>
+              <a:rPr lang="zh-CN" altLang="en-US" dirty="0"/>
+              <a:t>和</a:t>
+            </a:r>
+            <a:r>
+              <a:rPr lang="en-US" altLang="zh-CN" dirty="0"/>
+              <a:t>B</a:t>
+            </a:r>
+            <a:r>
+              <a:rPr lang="zh-CN" altLang="en-US" dirty="0"/>
+              <a:t>，</a:t>
+            </a:r>
+            <a:r>
+              <a:rPr lang="en-US" altLang="zh-CN" dirty="0"/>
+              <a:t>A</a:t>
+            </a:r>
+            <a:r>
+              <a:rPr lang="zh-CN" altLang="en-US" dirty="0"/>
+              <a:t>首先执行</a:t>
+            </a:r>
+            <a:r>
+              <a:rPr lang="en-US" altLang="zh-CN" dirty="0"/>
+              <a:t>writer()</a:t>
+            </a:r>
+            <a:r>
+              <a:rPr lang="zh-CN" altLang="en-US" dirty="0"/>
+              <a:t>方法，随后</a:t>
+            </a:r>
+            <a:r>
+              <a:rPr lang="en-US" altLang="zh-CN" dirty="0"/>
+              <a:t>B</a:t>
+            </a:r>
+            <a:r>
+              <a:rPr lang="zh-CN" altLang="en-US" dirty="0"/>
+              <a:t>线程接着执行</a:t>
+            </a:r>
+            <a:r>
+              <a:rPr lang="en-US" altLang="zh-CN" dirty="0"/>
+              <a:t>reader()</a:t>
+            </a:r>
+            <a:r>
+              <a:rPr lang="zh-CN" altLang="en-US" dirty="0"/>
+              <a:t>方法。线程</a:t>
+            </a:r>
+            <a:r>
+              <a:rPr lang="en-US" altLang="zh-CN" dirty="0"/>
+              <a:t>B</a:t>
+            </a:r>
+            <a:r>
+              <a:rPr lang="zh-CN" altLang="en-US" dirty="0"/>
+              <a:t>在执行操作</a:t>
+            </a:r>
+            <a:r>
+              <a:rPr lang="en-US" altLang="zh-CN" dirty="0"/>
+              <a:t>4</a:t>
+            </a:r>
+            <a:r>
+              <a:rPr lang="zh-CN" altLang="en-US" dirty="0"/>
+              <a:t>时，能否看到线程</a:t>
+            </a:r>
+            <a:r>
+              <a:rPr lang="en-US" altLang="zh-CN" dirty="0"/>
+              <a:t>A</a:t>
+            </a:r>
+            <a:r>
+              <a:rPr lang="zh-CN" altLang="en-US" dirty="0"/>
+              <a:t>在操作</a:t>
+            </a:r>
+            <a:r>
+              <a:rPr lang="en-US" altLang="zh-CN" dirty="0"/>
+              <a:t>1</a:t>
+            </a:r>
+            <a:r>
+              <a:rPr lang="zh-CN" altLang="en-US" dirty="0"/>
+              <a:t>对共享变量</a:t>
+            </a:r>
+            <a:r>
+              <a:rPr lang="en-US" altLang="zh-CN" dirty="0"/>
+              <a:t>a</a:t>
+            </a:r>
+            <a:r>
+              <a:rPr lang="zh-CN" altLang="en-US" dirty="0"/>
+              <a:t>的写入？</a:t>
+            </a:r>
+          </a:p>
+          <a:p>
+            <a:r>
+              <a:rPr lang="zh-CN" altLang="en-US"/>
+              <a:t>答案是：不一定能看到。</a:t>
+            </a:r>
+          </a:p>
+          <a:p>
+            <a:endParaRPr lang="en-US"/>
+          </a:p>
+        </p:txBody>
+      </p:sp>
+    </p:spTree>
+    <p:extLst>
+      <p:ext uri="{BB962C8B-B14F-4D97-AF65-F5344CB8AC3E}">
+        <p14:creationId xmlns:p14="http://schemas.microsoft.com/office/powerpoint/2010/main" val="4249807429"/>
+      </p:ext>
+    </p:extLst>
+  </p:cSld>
+  <p:clrMapOvr>
+    <a:masterClrMapping/>
+  </p:clrMapOvr>
+</p:sld>
+</file>
+
+<file path=ppt/slides/slide7.xml><?xml version="1.0" encoding="utf-8"?>
+<p:sld xmlns:a="http://schemas.openxmlformats.org/drawingml/2006/main" xmlns:r="http://schemas.openxmlformats.org/officeDocument/2006/relationships" xmlns:p="http://schemas.openxmlformats.org/presentationml/2006/main">
+  <p:cSld>
+    <p:spTree>
+      <p:nvGrpSpPr>
+        <p:cNvPr id="1" name=""/>
+        <p:cNvGrpSpPr/>
+        <p:nvPr/>
+      </p:nvGrpSpPr>
+      <p:grpSpPr>
+        <a:xfrm>
+          <a:off x="0" y="0"/>
+          <a:ext cx="0" cy="0"/>
+          <a:chOff x="0" y="0"/>
+          <a:chExt cx="0" cy="0"/>
+        </a:xfrm>
+      </p:grpSpPr>
+      <p:sp>
+        <p:nvSpPr>
+          <p:cNvPr id="2" name="Title 1"/>
+          <p:cNvSpPr>
+            <a:spLocks noGrp="1"/>
+          </p:cNvSpPr>
+          <p:nvPr>
+            <p:ph type="title"/>
+          </p:nvPr>
+        </p:nvSpPr>
+        <p:spPr/>
+        <p:txBody>
+          <a:bodyPr/>
+          <a:lstStyle/>
+          <a:p>
+            <a:r>
+              <a:rPr lang="en-US" dirty="0" err="1" smtClean="0"/>
+              <a:t>ThreadPoolExecutor</a:t>
+            </a:r>
+            <a:endParaRPr lang="en-US" dirty="0"/>
+          </a:p>
+        </p:txBody>
+      </p:sp>
+      <p:sp>
+        <p:nvSpPr>
+          <p:cNvPr id="3" name="Content Placeholder 2"/>
+          <p:cNvSpPr>
+            <a:spLocks noGrp="1"/>
+          </p:cNvSpPr>
+          <p:nvPr>
+            <p:ph idx="1"/>
+          </p:nvPr>
+        </p:nvSpPr>
+        <p:spPr>
+          <a:xfrm>
+            <a:off x="457200" y="1600201"/>
+            <a:ext cx="6324600" cy="2971800"/>
+          </a:xfrm>
+        </p:spPr>
+        <p:txBody>
+          <a:bodyPr>
+            <a:normAutofit fontScale="62500" lnSpcReduction="20000"/>
+          </a:bodyPr>
+          <a:lstStyle/>
+          <a:p>
+            <a:pPr marL="0" indent="0">
+              <a:buNone/>
+            </a:pPr>
+            <a:r>
+              <a:rPr lang="en-US" b="1" dirty="0"/>
+              <a:t>public </a:t>
+            </a:r>
+            <a:r>
+              <a:rPr lang="en-US" b="1" dirty="0" err="1"/>
+              <a:t>ThreadPoolExecutor</a:t>
+            </a:r>
+            <a:r>
+              <a:rPr lang="en-US" b="1" dirty="0"/>
+              <a:t>(</a:t>
+            </a:r>
+            <a:r>
+              <a:rPr lang="en-US" b="1" dirty="0" err="1"/>
+              <a:t>int</a:t>
+            </a:r>
+            <a:r>
+              <a:rPr lang="en-US" b="1" dirty="0"/>
+              <a:t> </a:t>
+            </a:r>
+            <a:r>
+              <a:rPr lang="en-US" b="1" dirty="0" err="1"/>
+              <a:t>corePoolSize</a:t>
+            </a:r>
+            <a:r>
+              <a:rPr lang="en-US" b="1" dirty="0"/>
+              <a:t>,</a:t>
+            </a:r>
+          </a:p>
+          <a:p>
+            <a:pPr marL="0" indent="0">
+              <a:buNone/>
+            </a:pPr>
+            <a:r>
+              <a:rPr lang="en-US" dirty="0"/>
+              <a:t>                              </a:t>
+            </a:r>
+            <a:r>
+              <a:rPr lang="en-US" b="1" dirty="0" err="1"/>
+              <a:t>int</a:t>
+            </a:r>
+            <a:r>
+              <a:rPr lang="en-US" b="1" dirty="0"/>
+              <a:t> </a:t>
+            </a:r>
+            <a:r>
+              <a:rPr lang="en-US" b="1" dirty="0" err="1"/>
+              <a:t>maximumPoolSize</a:t>
+            </a:r>
+            <a:r>
+              <a:rPr lang="en-US" b="1" dirty="0"/>
+              <a:t>,</a:t>
+            </a:r>
+          </a:p>
+          <a:p>
+            <a:pPr marL="0" indent="0">
+              <a:buNone/>
+            </a:pPr>
+            <a:r>
+              <a:rPr lang="en-US" dirty="0"/>
+              <a:t>                              </a:t>
+            </a:r>
+            <a:r>
+              <a:rPr lang="en-US" b="1" dirty="0"/>
+              <a:t>long </a:t>
+            </a:r>
+            <a:r>
+              <a:rPr lang="en-US" b="1" dirty="0" err="1"/>
+              <a:t>keepAliveTime</a:t>
+            </a:r>
+            <a:r>
+              <a:rPr lang="en-US" b="1" dirty="0"/>
+              <a:t>,</a:t>
+            </a:r>
+          </a:p>
+          <a:p>
+            <a:pPr marL="0" indent="0">
+              <a:buNone/>
+            </a:pPr>
+            <a:r>
+              <a:rPr lang="en-US" dirty="0"/>
+              <a:t>                              </a:t>
+            </a:r>
+            <a:r>
+              <a:rPr lang="en-US" dirty="0" err="1"/>
+              <a:t>TimeUnit</a:t>
+            </a:r>
+            <a:r>
+              <a:rPr lang="en-US" dirty="0"/>
+              <a:t> unit,</a:t>
+            </a:r>
+          </a:p>
+          <a:p>
+            <a:pPr marL="0" indent="0">
+              <a:buNone/>
+            </a:pPr>
+            <a:r>
+              <a:rPr lang="en-US" dirty="0"/>
+              <a:t>                              </a:t>
+            </a:r>
+            <a:r>
+              <a:rPr lang="en-US" dirty="0" err="1"/>
+              <a:t>BlockingQueue</a:t>
+            </a:r>
+            <a:r>
+              <a:rPr lang="en-US" dirty="0"/>
+              <a:t>&lt;Runnable&gt; </a:t>
+            </a:r>
+            <a:r>
+              <a:rPr lang="en-US" dirty="0" err="1"/>
+              <a:t>workQueue</a:t>
+            </a:r>
+            <a:r>
+              <a:rPr lang="en-US" dirty="0"/>
+              <a:t>) {</a:t>
+            </a:r>
+          </a:p>
+          <a:p>
+            <a:pPr marL="0" indent="0">
+              <a:buNone/>
+            </a:pPr>
+            <a:r>
+              <a:rPr lang="en-US" dirty="0"/>
+              <a:t>        </a:t>
+            </a:r>
+            <a:r>
+              <a:rPr lang="en-US" b="1" dirty="0"/>
+              <a:t>this(</a:t>
+            </a:r>
+            <a:r>
+              <a:rPr lang="en-US" b="1" dirty="0" err="1"/>
+              <a:t>corePoolSize</a:t>
+            </a:r>
+            <a:r>
+              <a:rPr lang="en-US" b="1" dirty="0"/>
+              <a:t>, </a:t>
+            </a:r>
+            <a:r>
+              <a:rPr lang="en-US" b="1" dirty="0" err="1"/>
+              <a:t>maximumPoolSize</a:t>
+            </a:r>
+            <a:r>
+              <a:rPr lang="en-US" b="1" dirty="0"/>
+              <a:t>, </a:t>
+            </a:r>
+            <a:r>
+              <a:rPr lang="en-US" b="1" dirty="0" err="1"/>
+              <a:t>keepAliveTime</a:t>
+            </a:r>
+            <a:r>
+              <a:rPr lang="en-US" b="1" dirty="0"/>
+              <a:t>, unit, </a:t>
+            </a:r>
+            <a:r>
+              <a:rPr lang="en-US" b="1" dirty="0" err="1"/>
+              <a:t>workQueue</a:t>
+            </a:r>
+            <a:r>
+              <a:rPr lang="en-US" b="1" dirty="0"/>
+              <a:t>,</a:t>
+            </a:r>
+          </a:p>
+          <a:p>
+            <a:pPr marL="0" indent="0">
+              <a:buNone/>
+            </a:pPr>
+            <a:r>
+              <a:rPr lang="en-US" dirty="0"/>
+              <a:t>             </a:t>
+            </a:r>
+            <a:r>
+              <a:rPr lang="en-US" dirty="0" err="1"/>
+              <a:t>Executors.</a:t>
+            </a:r>
+            <a:r>
+              <a:rPr lang="en-US" i="1" dirty="0" err="1"/>
+              <a:t>defaultThreadFactory</a:t>
+            </a:r>
+            <a:r>
+              <a:rPr lang="en-US" i="1" dirty="0"/>
+              <a:t>(), </a:t>
+            </a:r>
+            <a:r>
+              <a:rPr lang="en-US" b="1" i="1" dirty="0" err="1"/>
+              <a:t>defaultHandler</a:t>
+            </a:r>
+            <a:r>
+              <a:rPr lang="en-US" b="1" i="1" dirty="0"/>
+              <a:t>);</a:t>
+            </a:r>
+            <a:endParaRPr lang="en-US" dirty="0"/>
+          </a:p>
+        </p:txBody>
+      </p:sp>
+    </p:spTree>
+    <p:extLst>
+      <p:ext uri="{BB962C8B-B14F-4D97-AF65-F5344CB8AC3E}">
+        <p14:creationId xmlns:p14="http://schemas.microsoft.com/office/powerpoint/2010/main" val="284216610"/>
+      </p:ext>
+    </p:extLst>
+  </p:cSld>
+  <p:clrMapOvr>
+    <a:masterClrMapping/>
+  </p:clrMapOvr>
+</p:sld>
+</file>
+
+<file path=ppt/slides/slide8.xml><?xml version="1.0" encoding="utf-8"?>
+<p:sld xmlns:a="http://schemas.openxmlformats.org/drawingml/2006/main" xmlns:r="http://schemas.openxmlformats.org/officeDocument/2006/relationships" xmlns:p="http://schemas.openxmlformats.org/presentationml/2006/main">
+  <p:cSld>
+    <p:spTree>
+      <p:nvGrpSpPr>
+        <p:cNvPr id="1" name=""/>
+        <p:cNvGrpSpPr/>
+        <p:nvPr/>
+      </p:nvGrpSpPr>
+      <p:grpSpPr>
+        <a:xfrm>
+          <a:off x="0" y="0"/>
+          <a:ext cx="0" cy="0"/>
+          <a:chOff x="0" y="0"/>
+          <a:chExt cx="0" cy="0"/>
+        </a:xfrm>
+      </p:grpSpPr>
+      <p:sp>
+        <p:nvSpPr>
+          <p:cNvPr id="2" name="Title 1"/>
+          <p:cNvSpPr>
+            <a:spLocks noGrp="1"/>
+          </p:cNvSpPr>
+          <p:nvPr>
+            <p:ph type="title"/>
+          </p:nvPr>
+        </p:nvSpPr>
+        <p:spPr/>
+        <p:txBody>
+          <a:bodyPr/>
+          <a:lstStyle/>
+          <a:p>
             <a:r>
               <a:rPr lang="en-US" b="1" dirty="0" err="1"/>
               <a:t>RejectedExecutionHandler</a:t>
@@ -3741,7 +4551,7 @@
 </p:sld>
 </file>
 
-<file path=ppt/slides/slide5.xml><?xml version="1.0" encoding="utf-8"?>
+<file path=ppt/slides/slide9.xml><?xml version="1.0" encoding="utf-8"?>
 <p:sld xmlns:a="http://schemas.openxmlformats.org/drawingml/2006/main" xmlns:r="http://schemas.openxmlformats.org/officeDocument/2006/relationships" xmlns:p="http://schemas.openxmlformats.org/presentationml/2006/main">
   <p:cSld>
     <p:spTree>

</xml_diff>

<commit_message>
add new slides in java concurrency ppt.
</commit_message>
<xml_diff>
--- a/Document/Java Concurrency.pptx
+++ b/Document/Java Concurrency.pptx
@@ -5,7 +5,7 @@
     <p:sldMasterId id="2147483804" r:id="rId1"/>
   </p:sldMasterIdLst>
   <p:notesMasterIdLst>
-    <p:notesMasterId r:id="rId23"/>
+    <p:notesMasterId r:id="rId25"/>
   </p:notesMasterIdLst>
   <p:sldIdLst>
     <p:sldId id="256" r:id="rId2"/>
@@ -26,9 +26,11 @@
     <p:sldId id="276" r:id="rId17"/>
     <p:sldId id="279" r:id="rId18"/>
     <p:sldId id="280" r:id="rId19"/>
-    <p:sldId id="258" r:id="rId20"/>
-    <p:sldId id="259" r:id="rId21"/>
-    <p:sldId id="260" r:id="rId22"/>
+    <p:sldId id="283" r:id="rId20"/>
+    <p:sldId id="281" r:id="rId21"/>
+    <p:sldId id="282" r:id="rId22"/>
+    <p:sldId id="258" r:id="rId23"/>
+    <p:sldId id="259" r:id="rId24"/>
   </p:sldIdLst>
   <p:sldSz cx="9144000" cy="6858000" type="screen4x3"/>
   <p:notesSz cx="6858000" cy="9144000"/>
@@ -212,7 +214,7 @@
           <a:p>
             <a:fld id="{8D8AFEF8-1B2D-434C-A844-BA554DAF1F3A}" type="datetimeFigureOut">
               <a:rPr lang="en-US" smtClean="0"/>
-              <a:t>11/10/2014</a:t>
+              <a:t>11/27/2014</a:t>
             </a:fld>
             <a:endParaRPr lang="en-US"/>
           </a:p>
@@ -1667,6 +1669,90 @@
 </p:notes>
 </file>
 
+<file path=ppt/notesSlides/notesSlide6.xml><?xml version="1.0" encoding="utf-8"?>
+<p:notes xmlns:a="http://schemas.openxmlformats.org/drawingml/2006/main" xmlns:r="http://schemas.openxmlformats.org/officeDocument/2006/relationships" xmlns:p="http://schemas.openxmlformats.org/presentationml/2006/main">
+  <p:cSld>
+    <p:spTree>
+      <p:nvGrpSpPr>
+        <p:cNvPr id="1" name=""/>
+        <p:cNvGrpSpPr/>
+        <p:nvPr/>
+      </p:nvGrpSpPr>
+      <p:grpSpPr>
+        <a:xfrm>
+          <a:off x="0" y="0"/>
+          <a:ext cx="0" cy="0"/>
+          <a:chOff x="0" y="0"/>
+          <a:chExt cx="0" cy="0"/>
+        </a:xfrm>
+      </p:grpSpPr>
+      <p:sp>
+        <p:nvSpPr>
+          <p:cNvPr id="2" name="Slide Image Placeholder 1"/>
+          <p:cNvSpPr>
+            <a:spLocks noGrp="1" noRot="1" noChangeAspect="1"/>
+          </p:cNvSpPr>
+          <p:nvPr>
+            <p:ph type="sldImg"/>
+          </p:nvPr>
+        </p:nvSpPr>
+        <p:spPr/>
+      </p:sp>
+      <p:sp>
+        <p:nvSpPr>
+          <p:cNvPr id="3" name="Notes Placeholder 2"/>
+          <p:cNvSpPr>
+            <a:spLocks noGrp="1"/>
+          </p:cNvSpPr>
+          <p:nvPr>
+            <p:ph type="body" idx="1"/>
+          </p:nvPr>
+        </p:nvSpPr>
+        <p:spPr/>
+        <p:txBody>
+          <a:bodyPr/>
+          <a:lstStyle/>
+          <a:p>
+            <a:endParaRPr lang="en-US" dirty="0"/>
+          </a:p>
+        </p:txBody>
+      </p:sp>
+      <p:sp>
+        <p:nvSpPr>
+          <p:cNvPr id="4" name="Slide Number Placeholder 3"/>
+          <p:cNvSpPr>
+            <a:spLocks noGrp="1"/>
+          </p:cNvSpPr>
+          <p:nvPr>
+            <p:ph type="sldNum" sz="quarter" idx="10"/>
+          </p:nvPr>
+        </p:nvSpPr>
+        <p:spPr/>
+        <p:txBody>
+          <a:bodyPr/>
+          <a:lstStyle/>
+          <a:p>
+            <a:fld id="{9B888411-AF22-4FA6-9E93-5551DC85630F}" type="slidenum">
+              <a:rPr lang="en-US" smtClean="0"/>
+              <a:t>22</a:t>
+            </a:fld>
+            <a:endParaRPr lang="en-US"/>
+          </a:p>
+        </p:txBody>
+      </p:sp>
+    </p:spTree>
+    <p:extLst>
+      <p:ext uri="{BB962C8B-B14F-4D97-AF65-F5344CB8AC3E}">
+        <p14:creationId xmlns:p14="http://schemas.microsoft.com/office/powerpoint/2010/main" val="1615325114"/>
+      </p:ext>
+    </p:extLst>
+  </p:cSld>
+  <p:clrMapOvr>
+    <a:masterClrMapping/>
+  </p:clrMapOvr>
+</p:notes>
+</file>
+
 <file path=ppt/slideLayouts/slideLayout1.xml><?xml version="1.0" encoding="utf-8"?>
 <p:sldLayout xmlns:a="http://schemas.openxmlformats.org/drawingml/2006/main" xmlns:r="http://schemas.openxmlformats.org/officeDocument/2006/relationships" xmlns:p="http://schemas.openxmlformats.org/presentationml/2006/main" showMasterSp="0" type="title" preserve="1">
   <p:cSld name="Title Slide">
@@ -1862,7 +1948,7 @@
             <a:fld id="{1D8BD707-D9CF-40AE-B4C6-C98DA3205C09}" type="datetimeFigureOut">
               <a:rPr lang="en-US" smtClean="0"/>
               <a:pPr/>
-              <a:t>11/10/2014</a:t>
+              <a:t>11/27/2014</a:t>
             </a:fld>
             <a:endParaRPr lang="en-US"/>
           </a:p>
@@ -2217,7 +2303,7 @@
             <a:fld id="{1D8BD707-D9CF-40AE-B4C6-C98DA3205C09}" type="datetimeFigureOut">
               <a:rPr lang="en-US" smtClean="0"/>
               <a:pPr/>
-              <a:t>11/10/2014</a:t>
+              <a:t>11/27/2014</a:t>
             </a:fld>
             <a:endParaRPr lang="en-US"/>
           </a:p>
@@ -2394,7 +2480,7 @@
             <a:fld id="{1D8BD707-D9CF-40AE-B4C6-C98DA3205C09}" type="datetimeFigureOut">
               <a:rPr lang="en-US" smtClean="0"/>
               <a:pPr/>
-              <a:t>11/10/2014</a:t>
+              <a:t>11/27/2014</a:t>
             </a:fld>
             <a:endParaRPr lang="en-US"/>
           </a:p>
@@ -2509,7 +2595,7 @@
             <a:fld id="{1D8BD707-D9CF-40AE-B4C6-C98DA3205C09}" type="datetimeFigureOut">
               <a:rPr lang="en-US" smtClean="0"/>
               <a:pPr/>
-              <a:t>11/10/2014</a:t>
+              <a:t>11/27/2014</a:t>
             </a:fld>
             <a:endParaRPr lang="en-US"/>
           </a:p>
@@ -2869,7 +2955,7 @@
             <a:fld id="{1D8BD707-D9CF-40AE-B4C6-C98DA3205C09}" type="datetimeFigureOut">
               <a:rPr lang="en-US" smtClean="0"/>
               <a:pPr/>
-              <a:t>11/10/2014</a:t>
+              <a:t>11/27/2014</a:t>
             </a:fld>
             <a:endParaRPr lang="en-US"/>
           </a:p>
@@ -3136,7 +3222,7 @@
             <a:fld id="{1D8BD707-D9CF-40AE-B4C6-C98DA3205C09}" type="datetimeFigureOut">
               <a:rPr lang="en-US" smtClean="0"/>
               <a:pPr/>
-              <a:t>11/10/2014</a:t>
+              <a:t>11/27/2014</a:t>
             </a:fld>
             <a:endParaRPr lang="en-US"/>
           </a:p>
@@ -3500,7 +3586,7 @@
             <a:fld id="{1D8BD707-D9CF-40AE-B4C6-C98DA3205C09}" type="datetimeFigureOut">
               <a:rPr lang="en-US" smtClean="0"/>
               <a:pPr/>
-              <a:t>11/10/2014</a:t>
+              <a:t>11/27/2014</a:t>
             </a:fld>
             <a:endParaRPr lang="en-US"/>
           </a:p>
@@ -3729,7 +3815,7 @@
             <a:fld id="{1D8BD707-D9CF-40AE-B4C6-C98DA3205C09}" type="datetimeFigureOut">
               <a:rPr lang="en-US" smtClean="0"/>
               <a:pPr/>
-              <a:t>11/10/2014</a:t>
+              <a:t>11/27/2014</a:t>
             </a:fld>
             <a:endParaRPr lang="en-US"/>
           </a:p>
@@ -3821,7 +3907,7 @@
             <a:fld id="{1D8BD707-D9CF-40AE-B4C6-C98DA3205C09}" type="datetimeFigureOut">
               <a:rPr lang="en-US" smtClean="0"/>
               <a:pPr/>
-              <a:t>11/10/2014</a:t>
+              <a:t>11/27/2014</a:t>
             </a:fld>
             <a:endParaRPr lang="en-US"/>
           </a:p>
@@ -4090,7 +4176,7 @@
             <a:fld id="{1D8BD707-D9CF-40AE-B4C6-C98DA3205C09}" type="datetimeFigureOut">
               <a:rPr lang="en-US" smtClean="0"/>
               <a:pPr/>
-              <a:t>11/10/2014</a:t>
+              <a:t>11/27/2014</a:t>
             </a:fld>
             <a:endParaRPr lang="en-US"/>
           </a:p>
@@ -4320,7 +4406,7 @@
             <a:fld id="{1D8BD707-D9CF-40AE-B4C6-C98DA3205C09}" type="datetimeFigureOut">
               <a:rPr lang="en-US" smtClean="0"/>
               <a:pPr/>
-              <a:t>11/10/2014</a:t>
+              <a:t>11/27/2014</a:t>
             </a:fld>
             <a:endParaRPr lang="en-US"/>
           </a:p>
@@ -4821,7 +4907,7 @@
             <a:fld id="{1D8BD707-D9CF-40AE-B4C6-C98DA3205C09}" type="datetimeFigureOut">
               <a:rPr lang="en-US" smtClean="0"/>
               <a:pPr/>
-              <a:t>11/10/2014</a:t>
+              <a:t>11/27/2014</a:t>
             </a:fld>
             <a:endParaRPr lang="en-US"/>
           </a:p>
@@ -5264,17 +5350,6 @@
               </a:rPr>
               <a:t>Nick</a:t>
             </a:r>
-            <a:r>
-              <a:rPr lang="en-US" altLang="zh-CN" dirty="0" smtClean="0">
-                <a:solidFill>
-                  <a:schemeClr val="accent2">
-                    <a:lumMod val="60000"/>
-                    <a:lumOff val="40000"/>
-                  </a:schemeClr>
-                </a:solidFill>
-              </a:rPr>
-              <a:t/>
-            </a:r>
             <a:br>
               <a:rPr lang="en-US" altLang="zh-CN" dirty="0" smtClean="0">
                 <a:solidFill>
@@ -5347,11 +5422,7 @@
           <a:p>
             <a:r>
               <a:rPr lang="en-US" dirty="0" smtClean="0"/>
-              <a:t>Java </a:t>
-            </a:r>
-            <a:r>
-              <a:rPr lang="en-US" dirty="0" smtClean="0"/>
-              <a:t>Concurrency</a:t>
+              <a:t>Java Concurrency</a:t>
             </a:r>
           </a:p>
           <a:p>
@@ -6602,6 +6673,22 @@
             </a:r>
           </a:p>
           <a:p>
+            <a:pPr lvl="1"/>
+            <a:r>
+              <a:rPr lang="en-US" altLang="zh-CN" dirty="0" err="1" smtClean="0"/>
+              <a:t>ConcurrentLinkedQueue</a:t>
+            </a:r>
+            <a:endParaRPr lang="en-US" altLang="zh-CN" dirty="0" smtClean="0"/>
+          </a:p>
+          <a:p>
+            <a:pPr lvl="1"/>
+            <a:r>
+              <a:rPr lang="en-US" dirty="0" err="1"/>
+              <a:t>LinkedBlockingQueue</a:t>
+            </a:r>
+            <a:endParaRPr lang="en-US" altLang="zh-CN" dirty="0" smtClean="0"/>
+          </a:p>
+          <a:p>
             <a:r>
               <a:rPr lang="en-US" altLang="zh-CN" dirty="0" err="1" smtClean="0"/>
               <a:t>CopyOnWirteArrayList</a:t>
@@ -6626,9 +6713,28 @@
           </a:p>
           <a:p>
             <a:r>
+              <a:rPr lang="en-US" altLang="zh-CN" dirty="0" err="1" smtClean="0">
+                <a:solidFill>
+                  <a:srgbClr val="FFC000"/>
+                </a:solidFill>
+              </a:rPr>
+              <a:t>CurrentSkipListSet</a:t>
+            </a:r>
+            <a:endParaRPr lang="en-US" altLang="zh-CN" dirty="0" smtClean="0">
+              <a:solidFill>
+                <a:srgbClr val="FFC000"/>
+              </a:solidFill>
+            </a:endParaRPr>
+          </a:p>
+          <a:p>
+            <a:r>
               <a:rPr lang="en-US" altLang="zh-CN" dirty="0" err="1" smtClean="0"/>
-              <a:t>ConcurrentMap</a:t>
-            </a:r>
+              <a:t>ConcurrentHashMap</a:t>
+            </a:r>
+            <a:endParaRPr lang="en-US" altLang="zh-CN" dirty="0" smtClean="0"/>
+          </a:p>
+          <a:p>
+            <a:pPr lvl="1"/>
             <a:endParaRPr lang="en-US" dirty="0"/>
           </a:p>
         </p:txBody>
@@ -6679,8 +6785,8 @@
           <a:lstStyle/>
           <a:p>
             <a:r>
-              <a:rPr lang="en-US" dirty="0" err="1" smtClean="0"/>
-              <a:t>ThreadPoolExecutor</a:t>
+              <a:rPr lang="en-US" dirty="0" err="1"/>
+              <a:t>ConcurrentHashMap</a:t>
             </a:r>
             <a:endParaRPr lang="en-US" dirty="0"/>
           </a:p>
@@ -6696,210 +6802,157 @@
             <p:ph sz="quarter" idx="1"/>
           </p:nvPr>
         </p:nvSpPr>
-        <p:spPr>
-          <a:xfrm>
-            <a:off x="457200" y="1600201"/>
-            <a:ext cx="6324600" cy="2971800"/>
-          </a:xfrm>
-        </p:spPr>
+        <p:spPr/>
         <p:txBody>
           <a:bodyPr>
-            <a:normAutofit fontScale="85000" lnSpcReduction="20000"/>
+            <a:normAutofit fontScale="62500" lnSpcReduction="20000"/>
           </a:bodyPr>
           <a:lstStyle/>
           <a:p>
-            <a:pPr marL="0" indent="0">
-              <a:buNone/>
-            </a:pPr>
-            <a:r>
-              <a:rPr lang="en-US" b="1" dirty="0"/>
-              <a:t>public </a:t>
-            </a:r>
-            <a:r>
-              <a:rPr lang="en-US" b="1" dirty="0" err="1"/>
-              <a:t>ThreadPoolExecutor</a:t>
-            </a:r>
-            <a:r>
-              <a:rPr lang="en-US" b="1" dirty="0"/>
-              <a:t>(</a:t>
-            </a:r>
-            <a:r>
-              <a:rPr lang="en-US" b="1" dirty="0" err="1"/>
-              <a:t>int</a:t>
-            </a:r>
-            <a:r>
-              <a:rPr lang="en-US" b="1" dirty="0"/>
+            <a:r>
+              <a:rPr lang="en-US" dirty="0"/>
+              <a:t>/*</a:t>
+            </a:r>
+          </a:p>
+          <a:p>
+            <a:r>
+              <a:rPr lang="en-US" dirty="0"/>
+              <a:t>     * The basic strategy is to subdivide the table among Segments,</a:t>
+            </a:r>
+          </a:p>
+          <a:p>
+            <a:r>
+              <a:rPr lang="en-US" dirty="0"/>
+              <a:t>     * each of which itself is a concurrently readable hash table.  To</a:t>
+            </a:r>
+          </a:p>
+          <a:p>
+            <a:r>
+              <a:rPr lang="en-US" dirty="0"/>
+              <a:t>     * reduce footprint, all but one segments are constructed only</a:t>
+            </a:r>
+          </a:p>
+          <a:p>
+            <a:r>
+              <a:rPr lang="en-US" dirty="0"/>
+              <a:t>     * when first needed (see </a:t>
+            </a:r>
+            <a:r>
+              <a:rPr lang="en-US" dirty="0" err="1"/>
+              <a:t>ensureSegment</a:t>
+            </a:r>
+            <a:r>
+              <a:rPr lang="en-US" dirty="0"/>
+              <a:t>). To maintain visibility</a:t>
+            </a:r>
+          </a:p>
+          <a:p>
+            <a:r>
+              <a:rPr lang="en-US" dirty="0"/>
+              <a:t>     * in the presence of lazy construction, accesses to segments as</a:t>
+            </a:r>
+          </a:p>
+          <a:p>
+            <a:r>
+              <a:rPr lang="en-US" dirty="0"/>
+              <a:t>     * well as elements of segment's table must use volatile access,</a:t>
+            </a:r>
+          </a:p>
+          <a:p>
+            <a:r>
+              <a:rPr lang="en-US" dirty="0"/>
+              <a:t>     * which is done via Unsafe within methods </a:t>
+            </a:r>
+            <a:r>
+              <a:rPr lang="en-US" dirty="0" err="1"/>
+              <a:t>segmentAt</a:t>
+            </a:r>
+            <a:r>
+              <a:rPr lang="en-US" dirty="0"/>
               <a:t> </a:t>
             </a:r>
             <a:r>
-              <a:rPr lang="en-US" b="1" dirty="0" err="1"/>
-              <a:t>corePoolSize</a:t>
-            </a:r>
-            <a:r>
-              <a:rPr lang="en-US" b="1" dirty="0"/>
-              <a:t>,</a:t>
-            </a:r>
-          </a:p>
-          <a:p>
-            <a:pPr marL="0" indent="0">
-              <a:buNone/>
-            </a:pPr>
+              <a:rPr lang="en-US" dirty="0" err="1"/>
+              <a:t>etc</a:t>
+            </a:r>
+            <a:endParaRPr lang="en-US" dirty="0"/>
+          </a:p>
+          <a:p>
             <a:r>
               <a:rPr lang="en-US" dirty="0"/>
-              <a:t>                              </a:t>
-            </a:r>
-            <a:r>
-              <a:rPr lang="en-US" b="1" dirty="0" err="1"/>
-              <a:t>int</a:t>
-            </a:r>
-            <a:r>
-              <a:rPr lang="en-US" b="1" dirty="0"/>
-              <a:t> </a:t>
-            </a:r>
-            <a:r>
-              <a:rPr lang="en-US" b="1" dirty="0" err="1"/>
-              <a:t>maximumPoolSize</a:t>
-            </a:r>
-            <a:r>
-              <a:rPr lang="en-US" b="1" dirty="0"/>
-              <a:t>,</a:t>
-            </a:r>
-          </a:p>
-          <a:p>
-            <a:pPr marL="0" indent="0">
-              <a:buNone/>
-            </a:pPr>
+              <a:t>     * below. These provide the functionality of </a:t>
+            </a:r>
+            <a:r>
+              <a:rPr lang="en-US" dirty="0" err="1"/>
+              <a:t>AtomicReferenceArrays</a:t>
+            </a:r>
+            <a:endParaRPr lang="en-US" dirty="0"/>
+          </a:p>
+          <a:p>
             <a:r>
               <a:rPr lang="en-US" dirty="0"/>
-              <a:t>                              </a:t>
-            </a:r>
-            <a:r>
-              <a:rPr lang="en-US" b="1" dirty="0"/>
-              <a:t>long </a:t>
-            </a:r>
-            <a:r>
-              <a:rPr lang="en-US" b="1" dirty="0" err="1"/>
-              <a:t>keepAliveTime</a:t>
-            </a:r>
-            <a:r>
-              <a:rPr lang="en-US" b="1" dirty="0"/>
-              <a:t>,</a:t>
-            </a:r>
-          </a:p>
-          <a:p>
-            <a:pPr marL="0" indent="0">
-              <a:buNone/>
-            </a:pPr>
+              <a:t>     * but reduce the levels of indirection. Additionally,</a:t>
+            </a:r>
+          </a:p>
+          <a:p>
             <a:r>
               <a:rPr lang="en-US" dirty="0"/>
-              <a:t>                              </a:t>
+              <a:t>     * volatile-writes of table elements and entry "next" fields</a:t>
+            </a:r>
+          </a:p>
+          <a:p>
+            <a:r>
+              <a:rPr lang="en-US" dirty="0"/>
+              <a:t>     * within locked operations use the cheaper "</a:t>
             </a:r>
             <a:r>
               <a:rPr lang="en-US" dirty="0" err="1"/>
-              <a:t>TimeUnit</a:t>
+              <a:t>lazySet</a:t>
             </a:r>
             <a:r>
               <a:rPr lang="en-US" dirty="0"/>
-              <a:t> unit,</a:t>
-            </a:r>
-          </a:p>
-          <a:p>
-            <a:pPr marL="0" indent="0">
-              <a:buNone/>
-            </a:pPr>
+              <a:t>" forms of</a:t>
+            </a:r>
+          </a:p>
+          <a:p>
             <a:r>
               <a:rPr lang="en-US" dirty="0"/>
-              <a:t>                              </a:t>
+              <a:t>     * writes (via </a:t>
             </a:r>
             <a:r>
               <a:rPr lang="en-US" dirty="0" err="1"/>
-              <a:t>BlockingQueue</a:t>
+              <a:t>putOrderedObject</a:t>
             </a:r>
             <a:r>
               <a:rPr lang="en-US" dirty="0"/>
-              <a:t>&lt;Runnable&gt; </a:t>
-            </a:r>
-            <a:r>
-              <a:rPr lang="en-US" dirty="0" err="1"/>
-              <a:t>workQueue</a:t>
-            </a:r>
+              <a:t>) because these writes are always</a:t>
+            </a:r>
+          </a:p>
+          <a:p>
             <a:r>
               <a:rPr lang="en-US" dirty="0"/>
-              <a:t>) {</a:t>
-            </a:r>
-          </a:p>
-          <a:p>
-            <a:pPr marL="0" indent="0">
-              <a:buNone/>
-            </a:pPr>
+              <a:t>     * followed by lock releases that maintain sequential consistency</a:t>
+            </a:r>
+          </a:p>
+          <a:p>
             <a:r>
               <a:rPr lang="en-US" dirty="0"/>
-              <a:t>        </a:t>
-            </a:r>
-            <a:r>
-              <a:rPr lang="en-US" b="1" dirty="0"/>
-              <a:t>this(</a:t>
-            </a:r>
-            <a:r>
-              <a:rPr lang="en-US" b="1" dirty="0" err="1"/>
-              <a:t>corePoolSize</a:t>
-            </a:r>
-            <a:r>
-              <a:rPr lang="en-US" b="1" dirty="0"/>
-              <a:t>, </a:t>
-            </a:r>
-            <a:r>
-              <a:rPr lang="en-US" b="1" dirty="0" err="1"/>
-              <a:t>maximumPoolSize</a:t>
-            </a:r>
-            <a:r>
-              <a:rPr lang="en-US" b="1" dirty="0"/>
-              <a:t>, </a:t>
-            </a:r>
-            <a:r>
-              <a:rPr lang="en-US" b="1" dirty="0" err="1"/>
-              <a:t>keepAliveTime</a:t>
-            </a:r>
-            <a:r>
-              <a:rPr lang="en-US" b="1" dirty="0"/>
-              <a:t>, unit, </a:t>
-            </a:r>
-            <a:r>
-              <a:rPr lang="en-US" b="1" dirty="0" err="1"/>
-              <a:t>workQueue</a:t>
-            </a:r>
-            <a:r>
-              <a:rPr lang="en-US" b="1" dirty="0"/>
-              <a:t>,</a:t>
-            </a:r>
-          </a:p>
-          <a:p>
-            <a:pPr marL="0" indent="0">
-              <a:buNone/>
-            </a:pPr>
-            <a:r>
-              <a:rPr lang="en-US" dirty="0"/>
-              <a:t>             </a:t>
-            </a:r>
-            <a:r>
-              <a:rPr lang="en-US" dirty="0" err="1"/>
-              <a:t>Executors.</a:t>
-            </a:r>
-            <a:r>
-              <a:rPr lang="en-US" i="1" dirty="0" err="1"/>
-              <a:t>defaultThreadFactory</a:t>
-            </a:r>
-            <a:r>
-              <a:rPr lang="en-US" i="1" dirty="0"/>
-              <a:t>(), </a:t>
-            </a:r>
-            <a:r>
-              <a:rPr lang="en-US" b="1" i="1" dirty="0" err="1"/>
-              <a:t>defaultHandler</a:t>
-            </a:r>
-            <a:r>
-              <a:rPr lang="en-US" b="1" i="1" dirty="0"/>
-              <a:t>);</a:t>
+              <a:t>     * of table </a:t>
+            </a:r>
+            <a:r>
+              <a:rPr lang="en-US"/>
+              <a:t>updates</a:t>
+            </a:r>
+            <a:r>
+              <a:rPr lang="en-US" smtClean="0"/>
+              <a:t>.</a:t>
+            </a:r>
+            <a:endParaRPr lang="en-US" dirty="0"/>
+          </a:p>
+          <a:p>
+            <a:r>
+              <a:rPr lang="en-US" dirty="0" smtClean="0"/>
+              <a:t>*/</a:t>
             </a:r>
             <a:endParaRPr lang="en-US" dirty="0"/>
           </a:p>
@@ -6908,20 +6961,13 @@
     </p:spTree>
     <p:extLst>
       <p:ext uri="{BB962C8B-B14F-4D97-AF65-F5344CB8AC3E}">
-        <p14:creationId xmlns:p14="http://schemas.microsoft.com/office/powerpoint/2010/main" val="284216610"/>
+        <p14:creationId xmlns:p14="http://schemas.microsoft.com/office/powerpoint/2010/main" val="1692851927"/>
       </p:ext>
     </p:extLst>
   </p:cSld>
   <p:clrMapOvr>
     <a:masterClrMapping/>
   </p:clrMapOvr>
-  <p:timing>
-    <p:tnLst>
-      <p:par>
-        <p:cTn id="1" dur="indefinite" restart="never" nodeType="tmRoot"/>
-      </p:par>
-    </p:tnLst>
-  </p:timing>
 </p:sld>
 </file>
 
@@ -6999,7 +7045,6 @@
               <a:rPr lang="en-US" altLang="zh-CN" dirty="0" smtClean="0"/>
               <a:t>reorder</a:t>
             </a:r>
-            <a:endParaRPr lang="en-US" altLang="zh-CN" dirty="0" smtClean="0"/>
           </a:p>
           <a:p>
             <a:pPr lvl="1"/>
@@ -7007,7 +7052,6 @@
               <a:rPr lang="en-US" altLang="zh-CN" dirty="0" smtClean="0"/>
               <a:t>Happens-Before</a:t>
             </a:r>
-            <a:endParaRPr lang="en-US" altLang="zh-CN" dirty="0" smtClean="0"/>
           </a:p>
           <a:p>
             <a:pPr lvl="1"/>
@@ -7015,7 +7059,6 @@
               <a:rPr lang="en-US" altLang="zh-CN" dirty="0" smtClean="0"/>
               <a:t>Volatile</a:t>
             </a:r>
-            <a:endParaRPr lang="en-US" altLang="zh-CN" dirty="0" smtClean="0"/>
           </a:p>
           <a:p>
             <a:r>
@@ -7159,125 +7202,6 @@
         </p:nvSpPr>
         <p:spPr/>
         <p:txBody>
-          <a:bodyPr/>
-          <a:lstStyle/>
-          <a:p>
-            <a:r>
-              <a:rPr lang="en-US" b="1" dirty="0" err="1"/>
-              <a:t>RejectedExecutionHandler</a:t>
-            </a:r>
-            <a:endParaRPr lang="en-US" dirty="0"/>
-          </a:p>
-        </p:txBody>
-      </p:sp>
-      <p:sp>
-        <p:nvSpPr>
-          <p:cNvPr id="3" name="Content Placeholder 2"/>
-          <p:cNvSpPr>
-            <a:spLocks noGrp="1"/>
-          </p:cNvSpPr>
-          <p:nvPr>
-            <p:ph sz="quarter" idx="1"/>
-          </p:nvPr>
-        </p:nvSpPr>
-        <p:spPr/>
-        <p:txBody>
-          <a:bodyPr/>
-          <a:lstStyle/>
-          <a:p>
-            <a:r>
-              <a:rPr lang="en-US" b="1" dirty="0">
-                <a:hlinkClick r:id="rId2"/>
-              </a:rPr>
-              <a:t>http://</a:t>
-            </a:r>
-            <a:r>
-              <a:rPr lang="en-US" b="1" dirty="0" smtClean="0">
-                <a:hlinkClick r:id="rId2"/>
-              </a:rPr>
-              <a:t>dongxuan.iteye.com/blog/902571</a:t>
-            </a:r>
-            <a:endParaRPr lang="en-US" b="1" dirty="0" smtClean="0"/>
-          </a:p>
-          <a:p>
-            <a:r>
-              <a:rPr lang="en-US" b="1" dirty="0" err="1" smtClean="0"/>
-              <a:t>CallerRunsPolicy</a:t>
-            </a:r>
-            <a:endParaRPr lang="en-US" b="1" dirty="0" smtClean="0"/>
-          </a:p>
-          <a:p>
-            <a:r>
-              <a:rPr lang="en-US" b="1" dirty="0" err="1" smtClean="0"/>
-              <a:t>AbortPolicy</a:t>
-            </a:r>
-            <a:endParaRPr lang="en-US" b="1" dirty="0" smtClean="0"/>
-          </a:p>
-          <a:p>
-            <a:r>
-              <a:rPr lang="en-US" b="1" dirty="0" err="1" smtClean="0"/>
-              <a:t>DiscardPolicy</a:t>
-            </a:r>
-            <a:endParaRPr lang="en-US" b="1" dirty="0" smtClean="0"/>
-          </a:p>
-          <a:p>
-            <a:r>
-              <a:rPr lang="en-US" b="1" dirty="0" err="1"/>
-              <a:t>DiscardOldestPolicy</a:t>
-            </a:r>
-            <a:endParaRPr lang="en-US" dirty="0"/>
-          </a:p>
-        </p:txBody>
-      </p:sp>
-    </p:spTree>
-    <p:extLst>
-      <p:ext uri="{BB962C8B-B14F-4D97-AF65-F5344CB8AC3E}">
-        <p14:creationId xmlns:p14="http://schemas.microsoft.com/office/powerpoint/2010/main" val="731791040"/>
-      </p:ext>
-    </p:extLst>
-  </p:cSld>
-  <p:clrMapOvr>
-    <a:masterClrMapping/>
-  </p:clrMapOvr>
-  <p:timing>
-    <p:tnLst>
-      <p:par>
-        <p:cTn id="1" dur="indefinite" restart="never" nodeType="tmRoot"/>
-      </p:par>
-    </p:tnLst>
-  </p:timing>
-</p:sld>
-</file>
-
-<file path=ppt/slides/slide21.xml><?xml version="1.0" encoding="utf-8"?>
-<p:sld xmlns:a="http://schemas.openxmlformats.org/drawingml/2006/main" xmlns:r="http://schemas.openxmlformats.org/officeDocument/2006/relationships" xmlns:p="http://schemas.openxmlformats.org/presentationml/2006/main">
-  <p:cSld>
-    <p:spTree>
-      <p:nvGrpSpPr>
-        <p:cNvPr id="1" name=""/>
-        <p:cNvGrpSpPr/>
-        <p:nvPr/>
-      </p:nvGrpSpPr>
-      <p:grpSpPr>
-        <a:xfrm>
-          <a:off x="0" y="0"/>
-          <a:ext cx="0" cy="0"/>
-          <a:chOff x="0" y="0"/>
-          <a:chExt cx="0" cy="0"/>
-        </a:xfrm>
-      </p:grpSpPr>
-      <p:sp>
-        <p:nvSpPr>
-          <p:cNvPr id="2" name="Title 1"/>
-          <p:cNvSpPr>
-            <a:spLocks noGrp="1"/>
-          </p:cNvSpPr>
-          <p:nvPr>
-            <p:ph type="title"/>
-          </p:nvPr>
-        </p:nvSpPr>
-        <p:spPr/>
-        <p:txBody>
           <a:bodyPr>
             <a:normAutofit/>
           </a:bodyPr>
@@ -7285,7 +7209,7 @@
           <a:p>
             <a:r>
               <a:rPr lang="en-US" dirty="0" err="1" smtClean="0"/>
-              <a:t>ConcurrentMap</a:t>
+              <a:t>ConcurrentHashMap</a:t>
             </a:r>
             <a:endParaRPr lang="en-US" dirty="0"/>
           </a:p>
@@ -7367,13 +7291,512 @@
     </p:spTree>
     <p:extLst>
       <p:ext uri="{BB962C8B-B14F-4D97-AF65-F5344CB8AC3E}">
-        <p14:creationId xmlns:p14="http://schemas.microsoft.com/office/powerpoint/2010/main" val="614660712"/>
+        <p14:creationId xmlns:p14="http://schemas.microsoft.com/office/powerpoint/2010/main" val="1379782216"/>
       </p:ext>
     </p:extLst>
   </p:cSld>
   <p:clrMapOvr>
     <a:masterClrMapping/>
   </p:clrMapOvr>
+</p:sld>
+</file>
+
+<file path=ppt/slides/slide21.xml><?xml version="1.0" encoding="utf-8"?>
+<p:sld xmlns:a="http://schemas.openxmlformats.org/drawingml/2006/main" xmlns:r="http://schemas.openxmlformats.org/officeDocument/2006/relationships" xmlns:p="http://schemas.openxmlformats.org/presentationml/2006/main">
+  <p:cSld>
+    <p:spTree>
+      <p:nvGrpSpPr>
+        <p:cNvPr id="1" name=""/>
+        <p:cNvGrpSpPr/>
+        <p:nvPr/>
+      </p:nvGrpSpPr>
+      <p:grpSpPr>
+        <a:xfrm>
+          <a:off x="0" y="0"/>
+          <a:ext cx="0" cy="0"/>
+          <a:chOff x="0" y="0"/>
+          <a:chExt cx="0" cy="0"/>
+        </a:xfrm>
+      </p:grpSpPr>
+      <p:sp>
+        <p:nvSpPr>
+          <p:cNvPr id="2" name="Title 1"/>
+          <p:cNvSpPr>
+            <a:spLocks noGrp="1"/>
+          </p:cNvSpPr>
+          <p:nvPr>
+            <p:ph type="title"/>
+          </p:nvPr>
+        </p:nvSpPr>
+        <p:spPr/>
+        <p:txBody>
+          <a:bodyPr/>
+          <a:lstStyle/>
+          <a:p>
+            <a:r>
+              <a:rPr lang="en-US" dirty="0" err="1" smtClean="0"/>
+              <a:t>ConcurrentHashMap</a:t>
+            </a:r>
+            <a:endParaRPr lang="en-US" dirty="0"/>
+          </a:p>
+        </p:txBody>
+      </p:sp>
+      <p:pic>
+        <p:nvPicPr>
+          <p:cNvPr id="1026" name="Picture 2" descr="image"/>
+          <p:cNvPicPr>
+            <a:picLocks noChangeAspect="1" noChangeArrowheads="1"/>
+          </p:cNvPicPr>
+          <p:nvPr/>
+        </p:nvPicPr>
+        <p:blipFill>
+          <a:blip r:embed="rId2">
+            <a:extLst>
+              <a:ext uri="{28A0092B-C50C-407E-A947-70E740481C1C}">
+                <a14:useLocalDpi xmlns:a14="http://schemas.microsoft.com/office/drawing/2010/main" val="0"/>
+              </a:ext>
+            </a:extLst>
+          </a:blip>
+          <a:srcRect/>
+          <a:stretch>
+            <a:fillRect/>
+          </a:stretch>
+        </p:blipFill>
+        <p:spPr bwMode="auto">
+          <a:xfrm>
+            <a:off x="76200" y="1650741"/>
+            <a:ext cx="8991600" cy="3759459"/>
+          </a:xfrm>
+          <a:prstGeom prst="rect">
+            <a:avLst/>
+          </a:prstGeom>
+          <a:noFill/>
+          <a:extLst>
+            <a:ext uri="{909E8E84-426E-40DD-AFC4-6F175D3DCCD1}">
+              <a14:hiddenFill xmlns:a14="http://schemas.microsoft.com/office/drawing/2010/main">
+                <a:solidFill>
+                  <a:srgbClr val="FFFFFF"/>
+                </a:solidFill>
+              </a14:hiddenFill>
+            </a:ext>
+          </a:extLst>
+        </p:spPr>
+      </p:pic>
+    </p:spTree>
+    <p:extLst>
+      <p:ext uri="{BB962C8B-B14F-4D97-AF65-F5344CB8AC3E}">
+        <p14:creationId xmlns:p14="http://schemas.microsoft.com/office/powerpoint/2010/main" val="2533960227"/>
+      </p:ext>
+    </p:extLst>
+  </p:cSld>
+  <p:clrMapOvr>
+    <a:masterClrMapping/>
+  </p:clrMapOvr>
+</p:sld>
+</file>
+
+<file path=ppt/slides/slide22.xml><?xml version="1.0" encoding="utf-8"?>
+<p:sld xmlns:a="http://schemas.openxmlformats.org/drawingml/2006/main" xmlns:r="http://schemas.openxmlformats.org/officeDocument/2006/relationships" xmlns:p="http://schemas.openxmlformats.org/presentationml/2006/main">
+  <p:cSld>
+    <p:spTree>
+      <p:nvGrpSpPr>
+        <p:cNvPr id="1" name=""/>
+        <p:cNvGrpSpPr/>
+        <p:nvPr/>
+      </p:nvGrpSpPr>
+      <p:grpSpPr>
+        <a:xfrm>
+          <a:off x="0" y="0"/>
+          <a:ext cx="0" cy="0"/>
+          <a:chOff x="0" y="0"/>
+          <a:chExt cx="0" cy="0"/>
+        </a:xfrm>
+      </p:grpSpPr>
+      <p:sp>
+        <p:nvSpPr>
+          <p:cNvPr id="2" name="Title 1"/>
+          <p:cNvSpPr>
+            <a:spLocks noGrp="1"/>
+          </p:cNvSpPr>
+          <p:nvPr>
+            <p:ph type="title"/>
+          </p:nvPr>
+        </p:nvSpPr>
+        <p:spPr/>
+        <p:txBody>
+          <a:bodyPr/>
+          <a:lstStyle/>
+          <a:p>
+            <a:r>
+              <a:rPr lang="en-US" dirty="0" smtClean="0"/>
+              <a:t>Executor</a:t>
+            </a:r>
+            <a:endParaRPr lang="en-US" dirty="0"/>
+          </a:p>
+        </p:txBody>
+      </p:sp>
+      <p:sp>
+        <p:nvSpPr>
+          <p:cNvPr id="3" name="Content Placeholder 2"/>
+          <p:cNvSpPr>
+            <a:spLocks noGrp="1"/>
+          </p:cNvSpPr>
+          <p:nvPr>
+            <p:ph sz="quarter" idx="1"/>
+          </p:nvPr>
+        </p:nvSpPr>
+        <p:spPr>
+          <a:xfrm>
+            <a:off x="457200" y="1600201"/>
+            <a:ext cx="6324600" cy="2971800"/>
+          </a:xfrm>
+        </p:spPr>
+        <p:txBody>
+          <a:bodyPr>
+            <a:normAutofit fontScale="77500" lnSpcReduction="20000"/>
+          </a:bodyPr>
+          <a:lstStyle/>
+          <a:p>
+            <a:r>
+              <a:rPr lang="en-US" dirty="0" err="1"/>
+              <a:t>ThreadPoolExecutor</a:t>
+            </a:r>
+            <a:endParaRPr lang="en-US" b="1" dirty="0" smtClean="0"/>
+          </a:p>
+          <a:p>
+            <a:pPr marL="0" indent="0">
+              <a:buNone/>
+            </a:pPr>
+            <a:r>
+              <a:rPr lang="en-US" b="1" dirty="0" smtClean="0"/>
+              <a:t>public </a:t>
+            </a:r>
+            <a:r>
+              <a:rPr lang="en-US" b="1" dirty="0" err="1"/>
+              <a:t>ThreadPoolExecutor</a:t>
+            </a:r>
+            <a:r>
+              <a:rPr lang="en-US" b="1" dirty="0"/>
+              <a:t>(</a:t>
+            </a:r>
+            <a:r>
+              <a:rPr lang="en-US" b="1" dirty="0" err="1"/>
+              <a:t>int</a:t>
+            </a:r>
+            <a:r>
+              <a:rPr lang="en-US" b="1" dirty="0"/>
+              <a:t> </a:t>
+            </a:r>
+            <a:r>
+              <a:rPr lang="en-US" b="1" dirty="0" err="1"/>
+              <a:t>corePoolSize</a:t>
+            </a:r>
+            <a:r>
+              <a:rPr lang="en-US" b="1" dirty="0"/>
+              <a:t>,</a:t>
+            </a:r>
+          </a:p>
+          <a:p>
+            <a:pPr marL="0" indent="0">
+              <a:buNone/>
+            </a:pPr>
+            <a:r>
+              <a:rPr lang="en-US" dirty="0"/>
+              <a:t>                              </a:t>
+            </a:r>
+            <a:r>
+              <a:rPr lang="en-US" b="1" dirty="0" err="1"/>
+              <a:t>int</a:t>
+            </a:r>
+            <a:r>
+              <a:rPr lang="en-US" b="1" dirty="0"/>
+              <a:t> </a:t>
+            </a:r>
+            <a:r>
+              <a:rPr lang="en-US" b="1" dirty="0" err="1"/>
+              <a:t>maximumPoolSize</a:t>
+            </a:r>
+            <a:r>
+              <a:rPr lang="en-US" b="1" dirty="0"/>
+              <a:t>,</a:t>
+            </a:r>
+          </a:p>
+          <a:p>
+            <a:pPr marL="0" indent="0">
+              <a:buNone/>
+            </a:pPr>
+            <a:r>
+              <a:rPr lang="en-US" dirty="0"/>
+              <a:t>                              </a:t>
+            </a:r>
+            <a:r>
+              <a:rPr lang="en-US" b="1" dirty="0"/>
+              <a:t>long </a:t>
+            </a:r>
+            <a:r>
+              <a:rPr lang="en-US" b="1" dirty="0" err="1"/>
+              <a:t>keepAliveTime</a:t>
+            </a:r>
+            <a:r>
+              <a:rPr lang="en-US" b="1" dirty="0"/>
+              <a:t>,</a:t>
+            </a:r>
+          </a:p>
+          <a:p>
+            <a:pPr marL="0" indent="0">
+              <a:buNone/>
+            </a:pPr>
+            <a:r>
+              <a:rPr lang="en-US" dirty="0"/>
+              <a:t>                              </a:t>
+            </a:r>
+            <a:r>
+              <a:rPr lang="en-US" dirty="0" err="1"/>
+              <a:t>TimeUnit</a:t>
+            </a:r>
+            <a:r>
+              <a:rPr lang="en-US" dirty="0"/>
+              <a:t> unit,</a:t>
+            </a:r>
+          </a:p>
+          <a:p>
+            <a:pPr marL="0" indent="0">
+              <a:buNone/>
+            </a:pPr>
+            <a:r>
+              <a:rPr lang="en-US" dirty="0"/>
+              <a:t>                              </a:t>
+            </a:r>
+            <a:r>
+              <a:rPr lang="en-US" dirty="0" err="1"/>
+              <a:t>BlockingQueue</a:t>
+            </a:r>
+            <a:r>
+              <a:rPr lang="en-US" dirty="0"/>
+              <a:t>&lt;Runnable&gt; </a:t>
+            </a:r>
+            <a:r>
+              <a:rPr lang="en-US" dirty="0" err="1"/>
+              <a:t>workQueue</a:t>
+            </a:r>
+            <a:r>
+              <a:rPr lang="en-US" dirty="0"/>
+              <a:t>) {</a:t>
+            </a:r>
+          </a:p>
+          <a:p>
+            <a:pPr marL="0" indent="0">
+              <a:buNone/>
+            </a:pPr>
+            <a:r>
+              <a:rPr lang="en-US" dirty="0"/>
+              <a:t>        </a:t>
+            </a:r>
+            <a:r>
+              <a:rPr lang="en-US" b="1" dirty="0"/>
+              <a:t>this(</a:t>
+            </a:r>
+            <a:r>
+              <a:rPr lang="en-US" b="1" dirty="0" err="1"/>
+              <a:t>corePoolSize</a:t>
+            </a:r>
+            <a:r>
+              <a:rPr lang="en-US" b="1" dirty="0"/>
+              <a:t>, </a:t>
+            </a:r>
+            <a:r>
+              <a:rPr lang="en-US" b="1" dirty="0" err="1"/>
+              <a:t>maximumPoolSize</a:t>
+            </a:r>
+            <a:r>
+              <a:rPr lang="en-US" b="1" dirty="0"/>
+              <a:t>, </a:t>
+            </a:r>
+            <a:r>
+              <a:rPr lang="en-US" b="1" dirty="0" err="1"/>
+              <a:t>keepAliveTime</a:t>
+            </a:r>
+            <a:r>
+              <a:rPr lang="en-US" b="1" dirty="0"/>
+              <a:t>, unit, </a:t>
+            </a:r>
+            <a:r>
+              <a:rPr lang="en-US" b="1" dirty="0" err="1"/>
+              <a:t>workQueue</a:t>
+            </a:r>
+            <a:r>
+              <a:rPr lang="en-US" b="1" dirty="0"/>
+              <a:t>,</a:t>
+            </a:r>
+          </a:p>
+          <a:p>
+            <a:pPr marL="0" indent="0">
+              <a:buNone/>
+            </a:pPr>
+            <a:r>
+              <a:rPr lang="en-US" dirty="0"/>
+              <a:t>             </a:t>
+            </a:r>
+            <a:r>
+              <a:rPr lang="en-US" dirty="0" err="1"/>
+              <a:t>Executors.</a:t>
+            </a:r>
+            <a:r>
+              <a:rPr lang="en-US" i="1" dirty="0" err="1"/>
+              <a:t>defaultThreadFactory</a:t>
+            </a:r>
+            <a:r>
+              <a:rPr lang="en-US" i="1" dirty="0"/>
+              <a:t>(), </a:t>
+            </a:r>
+            <a:r>
+              <a:rPr lang="en-US" b="1" i="1" dirty="0" err="1"/>
+              <a:t>defaultHandler</a:t>
+            </a:r>
+            <a:r>
+              <a:rPr lang="en-US" b="1" i="1" dirty="0"/>
+              <a:t>);</a:t>
+            </a:r>
+            <a:endParaRPr lang="en-US" dirty="0"/>
+          </a:p>
+        </p:txBody>
+      </p:sp>
+    </p:spTree>
+    <p:extLst>
+      <p:ext uri="{BB962C8B-B14F-4D97-AF65-F5344CB8AC3E}">
+        <p14:creationId xmlns:p14="http://schemas.microsoft.com/office/powerpoint/2010/main" val="284216610"/>
+      </p:ext>
+    </p:extLst>
+  </p:cSld>
+  <p:clrMapOvr>
+    <a:masterClrMapping/>
+  </p:clrMapOvr>
+  <p:timing>
+    <p:tnLst>
+      <p:par>
+        <p:cTn id="1" dur="indefinite" restart="never" nodeType="tmRoot"/>
+      </p:par>
+    </p:tnLst>
+  </p:timing>
+</p:sld>
+</file>
+
+<file path=ppt/slides/slide23.xml><?xml version="1.0" encoding="utf-8"?>
+<p:sld xmlns:a="http://schemas.openxmlformats.org/drawingml/2006/main" xmlns:r="http://schemas.openxmlformats.org/officeDocument/2006/relationships" xmlns:p="http://schemas.openxmlformats.org/presentationml/2006/main">
+  <p:cSld>
+    <p:spTree>
+      <p:nvGrpSpPr>
+        <p:cNvPr id="1" name=""/>
+        <p:cNvGrpSpPr/>
+        <p:nvPr/>
+      </p:nvGrpSpPr>
+      <p:grpSpPr>
+        <a:xfrm>
+          <a:off x="0" y="0"/>
+          <a:ext cx="0" cy="0"/>
+          <a:chOff x="0" y="0"/>
+          <a:chExt cx="0" cy="0"/>
+        </a:xfrm>
+      </p:grpSpPr>
+      <p:sp>
+        <p:nvSpPr>
+          <p:cNvPr id="2" name="Title 1"/>
+          <p:cNvSpPr>
+            <a:spLocks noGrp="1"/>
+          </p:cNvSpPr>
+          <p:nvPr>
+            <p:ph type="title"/>
+          </p:nvPr>
+        </p:nvSpPr>
+        <p:spPr/>
+        <p:txBody>
+          <a:bodyPr/>
+          <a:lstStyle/>
+          <a:p>
+            <a:r>
+              <a:rPr lang="en-US" b="1" dirty="0" err="1"/>
+              <a:t>RejectedExecutionHandler</a:t>
+            </a:r>
+            <a:endParaRPr lang="en-US" dirty="0"/>
+          </a:p>
+        </p:txBody>
+      </p:sp>
+      <p:sp>
+        <p:nvSpPr>
+          <p:cNvPr id="3" name="Content Placeholder 2"/>
+          <p:cNvSpPr>
+            <a:spLocks noGrp="1"/>
+          </p:cNvSpPr>
+          <p:nvPr>
+            <p:ph sz="quarter" idx="1"/>
+          </p:nvPr>
+        </p:nvSpPr>
+        <p:spPr/>
+        <p:txBody>
+          <a:bodyPr/>
+          <a:lstStyle/>
+          <a:p>
+            <a:r>
+              <a:rPr lang="en-US" b="1" dirty="0">
+                <a:hlinkClick r:id="rId2"/>
+              </a:rPr>
+              <a:t>http://</a:t>
+            </a:r>
+            <a:r>
+              <a:rPr lang="en-US" b="1" dirty="0" smtClean="0">
+                <a:hlinkClick r:id="rId2"/>
+              </a:rPr>
+              <a:t>dongxuan.iteye.com/blog/902571</a:t>
+            </a:r>
+            <a:endParaRPr lang="en-US" b="1" dirty="0" smtClean="0"/>
+          </a:p>
+          <a:p>
+            <a:r>
+              <a:rPr lang="en-US" b="1" dirty="0" err="1" smtClean="0"/>
+              <a:t>CallerRunsPolicy</a:t>
+            </a:r>
+            <a:endParaRPr lang="en-US" b="1" dirty="0" smtClean="0"/>
+          </a:p>
+          <a:p>
+            <a:r>
+              <a:rPr lang="en-US" b="1" dirty="0" err="1" smtClean="0"/>
+              <a:t>AbortPolicy</a:t>
+            </a:r>
+            <a:endParaRPr lang="en-US" b="1" dirty="0" smtClean="0"/>
+          </a:p>
+          <a:p>
+            <a:r>
+              <a:rPr lang="en-US" b="1" dirty="0" err="1" smtClean="0"/>
+              <a:t>DiscardPolicy</a:t>
+            </a:r>
+            <a:endParaRPr lang="en-US" b="1" dirty="0" smtClean="0"/>
+          </a:p>
+          <a:p>
+            <a:r>
+              <a:rPr lang="en-US" b="1" dirty="0" err="1"/>
+              <a:t>DiscardOldestPolicy</a:t>
+            </a:r>
+            <a:endParaRPr lang="en-US" dirty="0"/>
+          </a:p>
+        </p:txBody>
+      </p:sp>
+    </p:spTree>
+    <p:extLst>
+      <p:ext uri="{BB962C8B-B14F-4D97-AF65-F5344CB8AC3E}">
+        <p14:creationId xmlns:p14="http://schemas.microsoft.com/office/powerpoint/2010/main" val="731791040"/>
+      </p:ext>
+    </p:extLst>
+  </p:cSld>
+  <p:clrMapOvr>
+    <a:masterClrMapping/>
+  </p:clrMapOvr>
+  <p:timing>
+    <p:tnLst>
+      <p:par>
+        <p:cTn id="1" dur="indefinite" restart="never" nodeType="tmRoot"/>
+      </p:par>
+    </p:tnLst>
+  </p:timing>
 </p:sld>
 </file>
 
@@ -7503,11 +7926,7 @@
             </a:r>
             <a:r>
               <a:rPr lang="zh-CN" altLang="en-US" sz="1600" dirty="0"/>
-              <a:t>里</a:t>
-            </a:r>
-            <a:r>
-              <a:rPr lang="zh-CN" altLang="en-US" sz="1600" dirty="0"/>
-              <a:t>都有很多寄存器，多级</a:t>
+              <a:t>里都有很多寄存器，多级</a:t>
             </a:r>
             <a:r>
               <a:rPr lang="en-US" altLang="zh-CN" sz="1600" dirty="0"/>
@@ -7754,10 +8173,6 @@
             <a:r>
               <a:rPr lang="zh-CN" altLang="en-US" dirty="0"/>
               <a:t>内存系统的重排序</a:t>
-            </a:r>
-            <a:r>
-              <a:rPr lang="zh-CN" altLang="en-US" dirty="0"/>
-              <a:t/>
             </a:r>
             <a:br>
               <a:rPr lang="zh-CN" altLang="en-US" dirty="0"/>
@@ -7908,11 +8323,7 @@
             <a:pPr lvl="1"/>
             <a:r>
               <a:rPr lang="en-US" dirty="0"/>
-              <a:t>Every thread is defined to have a working </a:t>
-            </a:r>
-            <a:r>
-              <a:rPr lang="en-US" dirty="0"/>
-              <a:t>memory</a:t>
+              <a:t>Every thread is defined to have a working memory</a:t>
             </a:r>
             <a:r>
               <a:rPr lang="en-US" dirty="0" smtClean="0"/>

</xml_diff>